<commit_message>
Package and Access Modiifer
</commit_message>
<xml_diff>
--- a/CoreJavaNotes.pptx
+++ b/CoreJavaNotes.pptx
@@ -5,7 +5,7 @@
     <p:sldMasterId id="2147483648" r:id="rId1"/>
   </p:sldMasterIdLst>
   <p:notesMasterIdLst>
-    <p:notesMasterId r:id="rId21"/>
+    <p:notesMasterId r:id="rId24"/>
   </p:notesMasterIdLst>
   <p:sldIdLst>
     <p:sldId id="265" r:id="rId2"/>
@@ -27,6 +27,9 @@
     <p:sldId id="281" r:id="rId18"/>
     <p:sldId id="282" r:id="rId19"/>
     <p:sldId id="283" r:id="rId20"/>
+    <p:sldId id="284" r:id="rId21"/>
+    <p:sldId id="285" r:id="rId22"/>
+    <p:sldId id="286" r:id="rId23"/>
   </p:sldIdLst>
   <p:sldSz cx="12192000" cy="6858000"/>
   <p:notesSz cx="6858000" cy="9144000"/>
@@ -215,7 +218,7 @@
           <a:p>
             <a:fld id="{31A22706-0000-41AF-B6FF-4DE11A567547}" type="datetimeFigureOut">
               <a:rPr lang="en-IN" smtClean="0"/>
-              <a:t>19-01-2021</a:t>
+              <a:t>22-01-2021</a:t>
             </a:fld>
             <a:endParaRPr lang="en-IN"/>
           </a:p>
@@ -794,7 +797,7 @@
           <a:p>
             <a:fld id="{A4F3704B-ED65-4BAA-9587-8FAC4677B14E}" type="datetimeFigureOut">
               <a:rPr lang="en-IN" smtClean="0"/>
-              <a:t>19-01-2021</a:t>
+              <a:t>22-01-2021</a:t>
             </a:fld>
             <a:endParaRPr lang="en-IN"/>
           </a:p>
@@ -964,7 +967,7 @@
           <a:p>
             <a:fld id="{A4F3704B-ED65-4BAA-9587-8FAC4677B14E}" type="datetimeFigureOut">
               <a:rPr lang="en-IN" smtClean="0"/>
-              <a:t>19-01-2021</a:t>
+              <a:t>22-01-2021</a:t>
             </a:fld>
             <a:endParaRPr lang="en-IN"/>
           </a:p>
@@ -1144,7 +1147,7 @@
           <a:p>
             <a:fld id="{A4F3704B-ED65-4BAA-9587-8FAC4677B14E}" type="datetimeFigureOut">
               <a:rPr lang="en-IN" smtClean="0"/>
-              <a:t>19-01-2021</a:t>
+              <a:t>22-01-2021</a:t>
             </a:fld>
             <a:endParaRPr lang="en-IN"/>
           </a:p>
@@ -1314,7 +1317,7 @@
           <a:p>
             <a:fld id="{A4F3704B-ED65-4BAA-9587-8FAC4677B14E}" type="datetimeFigureOut">
               <a:rPr lang="en-IN" smtClean="0"/>
-              <a:t>19-01-2021</a:t>
+              <a:t>22-01-2021</a:t>
             </a:fld>
             <a:endParaRPr lang="en-IN"/>
           </a:p>
@@ -1560,7 +1563,7 @@
           <a:p>
             <a:fld id="{A4F3704B-ED65-4BAA-9587-8FAC4677B14E}" type="datetimeFigureOut">
               <a:rPr lang="en-IN" smtClean="0"/>
-              <a:t>19-01-2021</a:t>
+              <a:t>22-01-2021</a:t>
             </a:fld>
             <a:endParaRPr lang="en-IN"/>
           </a:p>
@@ -1792,7 +1795,7 @@
           <a:p>
             <a:fld id="{A4F3704B-ED65-4BAA-9587-8FAC4677B14E}" type="datetimeFigureOut">
               <a:rPr lang="en-IN" smtClean="0"/>
-              <a:t>19-01-2021</a:t>
+              <a:t>22-01-2021</a:t>
             </a:fld>
             <a:endParaRPr lang="en-IN"/>
           </a:p>
@@ -2159,7 +2162,7 @@
           <a:p>
             <a:fld id="{A4F3704B-ED65-4BAA-9587-8FAC4677B14E}" type="datetimeFigureOut">
               <a:rPr lang="en-IN" smtClean="0"/>
-              <a:t>19-01-2021</a:t>
+              <a:t>22-01-2021</a:t>
             </a:fld>
             <a:endParaRPr lang="en-IN"/>
           </a:p>
@@ -2277,7 +2280,7 @@
           <a:p>
             <a:fld id="{A4F3704B-ED65-4BAA-9587-8FAC4677B14E}" type="datetimeFigureOut">
               <a:rPr lang="en-IN" smtClean="0"/>
-              <a:t>19-01-2021</a:t>
+              <a:t>22-01-2021</a:t>
             </a:fld>
             <a:endParaRPr lang="en-IN"/>
           </a:p>
@@ -2372,7 +2375,7 @@
           <a:p>
             <a:fld id="{A4F3704B-ED65-4BAA-9587-8FAC4677B14E}" type="datetimeFigureOut">
               <a:rPr lang="en-IN" smtClean="0"/>
-              <a:t>19-01-2021</a:t>
+              <a:t>22-01-2021</a:t>
             </a:fld>
             <a:endParaRPr lang="en-IN"/>
           </a:p>
@@ -2649,7 +2652,7 @@
           <a:p>
             <a:fld id="{A4F3704B-ED65-4BAA-9587-8FAC4677B14E}" type="datetimeFigureOut">
               <a:rPr lang="en-IN" smtClean="0"/>
-              <a:t>19-01-2021</a:t>
+              <a:t>22-01-2021</a:t>
             </a:fld>
             <a:endParaRPr lang="en-IN"/>
           </a:p>
@@ -2902,7 +2905,7 @@
           <a:p>
             <a:fld id="{A4F3704B-ED65-4BAA-9587-8FAC4677B14E}" type="datetimeFigureOut">
               <a:rPr lang="en-IN" smtClean="0"/>
-              <a:t>19-01-2021</a:t>
+              <a:t>22-01-2021</a:t>
             </a:fld>
             <a:endParaRPr lang="en-IN"/>
           </a:p>
@@ -3115,7 +3118,7 @@
           <a:p>
             <a:fld id="{A4F3704B-ED65-4BAA-9587-8FAC4677B14E}" type="datetimeFigureOut">
               <a:rPr lang="en-IN" smtClean="0"/>
-              <a:t>19-01-2021</a:t>
+              <a:t>22-01-2021</a:t>
             </a:fld>
             <a:endParaRPr lang="en-IN"/>
           </a:p>
@@ -7210,23 +7213,7 @@
                 <a:ea typeface="Verdana" panose="020B0604030504040204" pitchFamily="34" charset="0"/>
                 <a:cs typeface="Verdana" panose="020B0604030504040204" pitchFamily="34" charset="0"/>
               </a:rPr>
-              <a:t>byte, short</a:t>
-            </a:r>
-            <a:r>
-              <a:rPr lang="en-IN" sz="1400" dirty="0" smtClean="0">
-                <a:latin typeface="Verdana" panose="020B0604030504040204" pitchFamily="34" charset="0"/>
-                <a:ea typeface="Verdana" panose="020B0604030504040204" pitchFamily="34" charset="0"/>
-                <a:cs typeface="Verdana" panose="020B0604030504040204" pitchFamily="34" charset="0"/>
-              </a:rPr>
-              <a:t> or char</a:t>
-            </a:r>
-            <a:r>
-              <a:rPr lang="en-IN" sz="1400" dirty="0" smtClean="0">
-                <a:latin typeface="Verdana" panose="020B0604030504040204" pitchFamily="34" charset="0"/>
-                <a:ea typeface="Verdana" panose="020B0604030504040204" pitchFamily="34" charset="0"/>
-                <a:cs typeface="Verdana" panose="020B0604030504040204" pitchFamily="34" charset="0"/>
-              </a:rPr>
-              <a:t> </a:t>
+              <a:t>byte, short or char </a:t>
             </a:r>
             <a:r>
               <a:rPr lang="en-IN" sz="1400" dirty="0">
@@ -13925,6 +13912,1121 @@
     <p:extLst>
       <p:ext uri="{BB962C8B-B14F-4D97-AF65-F5344CB8AC3E}">
         <p14:creationId xmlns:p14="http://schemas.microsoft.com/office/powerpoint/2010/main" val="559257282"/>
+      </p:ext>
+    </p:extLst>
+  </p:cSld>
+  <p:clrMapOvr>
+    <a:masterClrMapping/>
+  </p:clrMapOvr>
+  <p:timing>
+    <p:tnLst>
+      <p:par>
+        <p:cTn id="1" dur="indefinite" restart="never" nodeType="tmRoot"/>
+      </p:par>
+    </p:tnLst>
+  </p:timing>
+</p:sld>
+</file>
+
+<file path=ppt/slides/slide20.xml><?xml version="1.0" encoding="utf-8"?>
+<p:sld xmlns:a="http://schemas.openxmlformats.org/drawingml/2006/main" xmlns:r="http://schemas.openxmlformats.org/officeDocument/2006/relationships" xmlns:p="http://schemas.openxmlformats.org/presentationml/2006/main">
+  <p:cSld>
+    <p:spTree>
+      <p:nvGrpSpPr>
+        <p:cNvPr id="1" name=""/>
+        <p:cNvGrpSpPr/>
+        <p:nvPr/>
+      </p:nvGrpSpPr>
+      <p:grpSpPr>
+        <a:xfrm>
+          <a:off x="0" y="0"/>
+          <a:ext cx="0" cy="0"/>
+          <a:chOff x="0" y="0"/>
+          <a:chExt cx="0" cy="0"/>
+        </a:xfrm>
+      </p:grpSpPr>
+      <p:sp>
+        <p:nvSpPr>
+          <p:cNvPr id="2" name="Title 1"/>
+          <p:cNvSpPr>
+            <a:spLocks noGrp="1"/>
+          </p:cNvSpPr>
+          <p:nvPr>
+            <p:ph type="title"/>
+          </p:nvPr>
+        </p:nvSpPr>
+        <p:spPr>
+          <a:xfrm>
+            <a:off x="838200" y="365125"/>
+            <a:ext cx="10515600" cy="562923"/>
+          </a:xfrm>
+        </p:spPr>
+        <p:txBody>
+          <a:bodyPr>
+            <a:normAutofit/>
+          </a:bodyPr>
+          <a:lstStyle/>
+          <a:p>
+            <a:r>
+              <a:rPr lang="en-IN" sz="2000" dirty="0" smtClean="0">
+                <a:latin typeface="Verdana" panose="020B0604030504040204" pitchFamily="34" charset="0"/>
+                <a:ea typeface="Verdana" panose="020B0604030504040204" pitchFamily="34" charset="0"/>
+                <a:cs typeface="Verdana" panose="020B0604030504040204" pitchFamily="34" charset="0"/>
+              </a:rPr>
+              <a:t>Package</a:t>
+            </a:r>
+            <a:endParaRPr lang="en-IN" sz="2000" dirty="0">
+              <a:latin typeface="Verdana" panose="020B0604030504040204" pitchFamily="34" charset="0"/>
+              <a:ea typeface="Verdana" panose="020B0604030504040204" pitchFamily="34" charset="0"/>
+              <a:cs typeface="Verdana" panose="020B0604030504040204" pitchFamily="34" charset="0"/>
+            </a:endParaRPr>
+          </a:p>
+        </p:txBody>
+      </p:sp>
+      <p:sp>
+        <p:nvSpPr>
+          <p:cNvPr id="3" name="Content Placeholder 2"/>
+          <p:cNvSpPr>
+            <a:spLocks noGrp="1"/>
+          </p:cNvSpPr>
+          <p:nvPr>
+            <p:ph idx="1"/>
+          </p:nvPr>
+        </p:nvSpPr>
+        <p:spPr>
+          <a:xfrm>
+            <a:off x="838200" y="1132764"/>
+            <a:ext cx="10515600" cy="5044199"/>
+          </a:xfrm>
+        </p:spPr>
+        <p:txBody>
+          <a:bodyPr>
+            <a:normAutofit/>
+          </a:bodyPr>
+          <a:lstStyle/>
+          <a:p>
+            <a:r>
+              <a:rPr lang="en-IN" sz="1400" dirty="0" smtClean="0">
+                <a:latin typeface="Verdana" panose="020B0604030504040204" pitchFamily="34" charset="0"/>
+                <a:ea typeface="Verdana" panose="020B0604030504040204" pitchFamily="34" charset="0"/>
+                <a:cs typeface="Verdana" panose="020B0604030504040204" pitchFamily="34" charset="0"/>
+              </a:rPr>
+              <a:t>A folder this is linked with java class is called package.</a:t>
+            </a:r>
+          </a:p>
+          <a:p>
+            <a:r>
+              <a:rPr lang="en-IN" sz="1400" dirty="0" smtClean="0">
+                <a:latin typeface="Verdana" panose="020B0604030504040204" pitchFamily="34" charset="0"/>
+                <a:ea typeface="Verdana" panose="020B0604030504040204" pitchFamily="34" charset="0"/>
+                <a:cs typeface="Verdana" panose="020B0604030504040204" pitchFamily="34" charset="0"/>
+              </a:rPr>
+              <a:t>Package are used to organize related or similar class, interfaces and enum into one group. For example, </a:t>
+            </a:r>
+            <a:r>
+              <a:rPr lang="en-IN" sz="1400" dirty="0" err="1" smtClean="0">
+                <a:latin typeface="Verdana" panose="020B0604030504040204" pitchFamily="34" charset="0"/>
+                <a:ea typeface="Verdana" panose="020B0604030504040204" pitchFamily="34" charset="0"/>
+                <a:cs typeface="Verdana" panose="020B0604030504040204" pitchFamily="34" charset="0"/>
+              </a:rPr>
+              <a:t>java.sql</a:t>
+            </a:r>
+            <a:r>
+              <a:rPr lang="en-IN" sz="1400" dirty="0" smtClean="0">
+                <a:latin typeface="Verdana" panose="020B0604030504040204" pitchFamily="34" charset="0"/>
+                <a:ea typeface="Verdana" panose="020B0604030504040204" pitchFamily="34" charset="0"/>
+                <a:cs typeface="Verdana" panose="020B0604030504040204" pitchFamily="34" charset="0"/>
+              </a:rPr>
+              <a:t> package has all classes needed for database operation. Java.io package has classes related to input-output operation.</a:t>
+            </a:r>
+          </a:p>
+          <a:p>
+            <a:r>
+              <a:rPr lang="en-IN" sz="1400" dirty="0" smtClean="0">
+                <a:latin typeface="Verdana" panose="020B0604030504040204" pitchFamily="34" charset="0"/>
+                <a:ea typeface="Verdana" panose="020B0604030504040204" pitchFamily="34" charset="0"/>
+                <a:cs typeface="Verdana" panose="020B0604030504040204" pitchFamily="34" charset="0"/>
+              </a:rPr>
+              <a:t>Packages are also used to avoid naming conflict between the classes. Using package, we can give same name to different classes.</a:t>
+            </a:r>
+          </a:p>
+          <a:p>
+            <a:r>
+              <a:rPr lang="en-IN" sz="1400" b="1" dirty="0" smtClean="0">
+                <a:latin typeface="Verdana" panose="020B0604030504040204" pitchFamily="34" charset="0"/>
+                <a:ea typeface="Verdana" panose="020B0604030504040204" pitchFamily="34" charset="0"/>
+                <a:cs typeface="Verdana" panose="020B0604030504040204" pitchFamily="34" charset="0"/>
+              </a:rPr>
+              <a:t>Syntax</a:t>
+            </a:r>
+            <a:r>
+              <a:rPr lang="en-IN" sz="1400" dirty="0" smtClean="0">
+                <a:latin typeface="Verdana" panose="020B0604030504040204" pitchFamily="34" charset="0"/>
+                <a:ea typeface="Verdana" panose="020B0604030504040204" pitchFamily="34" charset="0"/>
+                <a:cs typeface="Verdana" panose="020B0604030504040204" pitchFamily="34" charset="0"/>
+              </a:rPr>
+              <a:t>:</a:t>
+            </a:r>
+          </a:p>
+          <a:p>
+            <a:pPr marL="0" indent="0">
+              <a:buNone/>
+            </a:pPr>
+            <a:r>
+              <a:rPr lang="en-IN" sz="1400" b="1" i="1" dirty="0">
+                <a:latin typeface="Verdana" panose="020B0604030504040204" pitchFamily="34" charset="0"/>
+                <a:ea typeface="Verdana" panose="020B0604030504040204" pitchFamily="34" charset="0"/>
+                <a:cs typeface="Verdana" panose="020B0604030504040204" pitchFamily="34" charset="0"/>
+              </a:rPr>
+              <a:t>p</a:t>
+            </a:r>
+            <a:r>
+              <a:rPr lang="en-IN" sz="1400" b="1" i="1" dirty="0" smtClean="0">
+                <a:latin typeface="Verdana" panose="020B0604030504040204" pitchFamily="34" charset="0"/>
+                <a:ea typeface="Verdana" panose="020B0604030504040204" pitchFamily="34" charset="0"/>
+                <a:cs typeface="Verdana" panose="020B0604030504040204" pitchFamily="34" charset="0"/>
+              </a:rPr>
+              <a:t>ackage &lt;package name&gt;;</a:t>
+            </a:r>
+          </a:p>
+          <a:p>
+            <a:r>
+              <a:rPr lang="en-IN" sz="1400" dirty="0" smtClean="0">
+                <a:latin typeface="Verdana" panose="020B0604030504040204" pitchFamily="34" charset="0"/>
+                <a:ea typeface="Verdana" panose="020B0604030504040204" pitchFamily="34" charset="0"/>
+                <a:cs typeface="Verdana" panose="020B0604030504040204" pitchFamily="34" charset="0"/>
+              </a:rPr>
+              <a:t>package statement should be first statement in a java file.</a:t>
+            </a:r>
+          </a:p>
+          <a:p>
+            <a:r>
+              <a:rPr lang="en-IN" sz="1400" b="1" dirty="0" smtClean="0">
+                <a:latin typeface="Verdana" panose="020B0604030504040204" pitchFamily="34" charset="0"/>
+                <a:ea typeface="Verdana" panose="020B0604030504040204" pitchFamily="34" charset="0"/>
+                <a:cs typeface="Verdana" panose="020B0604030504040204" pitchFamily="34" charset="0"/>
+              </a:rPr>
+              <a:t>Compilation:</a:t>
+            </a:r>
+          </a:p>
+          <a:p>
+            <a:pPr marL="0" indent="0">
+              <a:buNone/>
+            </a:pPr>
+            <a:r>
+              <a:rPr lang="en-IN" sz="1400" b="1" dirty="0" err="1">
+                <a:latin typeface="Verdana" panose="020B0604030504040204" pitchFamily="34" charset="0"/>
+                <a:ea typeface="Verdana" panose="020B0604030504040204" pitchFamily="34" charset="0"/>
+                <a:cs typeface="Verdana" panose="020B0604030504040204" pitchFamily="34" charset="0"/>
+              </a:rPr>
+              <a:t>j</a:t>
+            </a:r>
+            <a:r>
+              <a:rPr lang="en-IN" sz="1400" b="1" dirty="0" err="1" smtClean="0">
+                <a:latin typeface="Verdana" panose="020B0604030504040204" pitchFamily="34" charset="0"/>
+                <a:ea typeface="Verdana" panose="020B0604030504040204" pitchFamily="34" charset="0"/>
+                <a:cs typeface="Verdana" panose="020B0604030504040204" pitchFamily="34" charset="0"/>
+              </a:rPr>
+              <a:t>avac</a:t>
+            </a:r>
+            <a:r>
+              <a:rPr lang="en-IN" sz="1400" b="1" dirty="0" smtClean="0">
+                <a:latin typeface="Verdana" panose="020B0604030504040204" pitchFamily="34" charset="0"/>
+                <a:ea typeface="Verdana" panose="020B0604030504040204" pitchFamily="34" charset="0"/>
+                <a:cs typeface="Verdana" panose="020B0604030504040204" pitchFamily="34" charset="0"/>
+              </a:rPr>
+              <a:t> –d &lt;path in which package should be copied&gt; source filename</a:t>
+            </a:r>
+          </a:p>
+          <a:p>
+            <a:r>
+              <a:rPr lang="en-IN" sz="1400" b="1" dirty="0" smtClean="0">
+                <a:latin typeface="Verdana" panose="020B0604030504040204" pitchFamily="34" charset="0"/>
+                <a:ea typeface="Verdana" panose="020B0604030504040204" pitchFamily="34" charset="0"/>
+                <a:cs typeface="Verdana" panose="020B0604030504040204" pitchFamily="34" charset="0"/>
+              </a:rPr>
+              <a:t>Execution:</a:t>
+            </a:r>
+          </a:p>
+          <a:p>
+            <a:pPr marL="0" indent="0">
+              <a:buNone/>
+            </a:pPr>
+            <a:r>
+              <a:rPr lang="en-IN" sz="1400" b="1" dirty="0" smtClean="0">
+                <a:latin typeface="Verdana" panose="020B0604030504040204" pitchFamily="34" charset="0"/>
+                <a:ea typeface="Verdana" panose="020B0604030504040204" pitchFamily="34" charset="0"/>
+                <a:cs typeface="Verdana" panose="020B0604030504040204" pitchFamily="34" charset="0"/>
+              </a:rPr>
+              <a:t>java &lt;</a:t>
+            </a:r>
+            <a:r>
+              <a:rPr lang="en-IN" sz="1400" b="1" dirty="0" err="1" smtClean="0">
+                <a:latin typeface="Verdana" panose="020B0604030504040204" pitchFamily="34" charset="0"/>
+                <a:ea typeface="Verdana" panose="020B0604030504040204" pitchFamily="34" charset="0"/>
+                <a:cs typeface="Verdana" panose="020B0604030504040204" pitchFamily="34" charset="0"/>
+              </a:rPr>
+              <a:t>packagename</a:t>
+            </a:r>
+            <a:r>
+              <a:rPr lang="en-IN" sz="1400" b="1" dirty="0" smtClean="0">
+                <a:latin typeface="Verdana" panose="020B0604030504040204" pitchFamily="34" charset="0"/>
+                <a:ea typeface="Verdana" panose="020B0604030504040204" pitchFamily="34" charset="0"/>
+                <a:cs typeface="Verdana" panose="020B0604030504040204" pitchFamily="34" charset="0"/>
+              </a:rPr>
+              <a:t>&gt;.&lt;</a:t>
+            </a:r>
+            <a:r>
+              <a:rPr lang="en-IN" sz="1400" b="1" dirty="0" err="1" smtClean="0">
+                <a:latin typeface="Verdana" panose="020B0604030504040204" pitchFamily="34" charset="0"/>
+                <a:ea typeface="Verdana" panose="020B0604030504040204" pitchFamily="34" charset="0"/>
+                <a:cs typeface="Verdana" panose="020B0604030504040204" pitchFamily="34" charset="0"/>
+              </a:rPr>
+              <a:t>classname</a:t>
+            </a:r>
+            <a:r>
+              <a:rPr lang="en-IN" sz="1400" b="1" dirty="0" smtClean="0">
+                <a:latin typeface="Verdana" panose="020B0604030504040204" pitchFamily="34" charset="0"/>
+                <a:ea typeface="Verdana" panose="020B0604030504040204" pitchFamily="34" charset="0"/>
+                <a:cs typeface="Verdana" panose="020B0604030504040204" pitchFamily="34" charset="0"/>
+              </a:rPr>
+              <a:t> which have main method&gt;</a:t>
+            </a:r>
+          </a:p>
+          <a:p>
+            <a:r>
+              <a:rPr lang="en-IN" sz="1400" dirty="0" smtClean="0">
+                <a:latin typeface="Verdana" panose="020B0604030504040204" pitchFamily="34" charset="0"/>
+                <a:ea typeface="Verdana" panose="020B0604030504040204" pitchFamily="34" charset="0"/>
+                <a:cs typeface="Verdana" panose="020B0604030504040204" pitchFamily="34" charset="0"/>
+              </a:rPr>
+              <a:t>Three ways to update the </a:t>
+            </a:r>
+            <a:r>
+              <a:rPr lang="en-IN" sz="1400" dirty="0" err="1" smtClean="0">
+                <a:latin typeface="Verdana" panose="020B0604030504040204" pitchFamily="34" charset="0"/>
+                <a:ea typeface="Verdana" panose="020B0604030504040204" pitchFamily="34" charset="0"/>
+                <a:cs typeface="Verdana" panose="020B0604030504040204" pitchFamily="34" charset="0"/>
+              </a:rPr>
+              <a:t>classpath</a:t>
+            </a:r>
+            <a:r>
+              <a:rPr lang="en-IN" sz="1400" dirty="0" smtClean="0">
+                <a:latin typeface="Verdana" panose="020B0604030504040204" pitchFamily="34" charset="0"/>
+                <a:ea typeface="Verdana" panose="020B0604030504040204" pitchFamily="34" charset="0"/>
+                <a:cs typeface="Verdana" panose="020B0604030504040204" pitchFamily="34" charset="0"/>
+              </a:rPr>
+              <a:t> </a:t>
+            </a:r>
+          </a:p>
+          <a:p>
+            <a:pPr marL="342900" indent="-342900">
+              <a:buFont typeface="+mj-lt"/>
+              <a:buAutoNum type="arabicPeriod"/>
+            </a:pPr>
+            <a:r>
+              <a:rPr lang="en-IN" sz="1400" dirty="0" smtClean="0">
+                <a:latin typeface="Verdana" panose="020B0604030504040204" pitchFamily="34" charset="0"/>
+                <a:ea typeface="Verdana" panose="020B0604030504040204" pitchFamily="34" charset="0"/>
+                <a:cs typeface="Verdana" panose="020B0604030504040204" pitchFamily="34" charset="0"/>
+              </a:rPr>
+              <a:t>Using java command option “-</a:t>
+            </a:r>
+            <a:r>
+              <a:rPr lang="en-IN" sz="1400" dirty="0" err="1" smtClean="0">
+                <a:latin typeface="Verdana" panose="020B0604030504040204" pitchFamily="34" charset="0"/>
+                <a:ea typeface="Verdana" panose="020B0604030504040204" pitchFamily="34" charset="0"/>
+                <a:cs typeface="Verdana" panose="020B0604030504040204" pitchFamily="34" charset="0"/>
+              </a:rPr>
+              <a:t>cp</a:t>
+            </a:r>
+            <a:r>
+              <a:rPr lang="en-IN" sz="1400" dirty="0" smtClean="0">
+                <a:latin typeface="Verdana" panose="020B0604030504040204" pitchFamily="34" charset="0"/>
+                <a:ea typeface="Verdana" panose="020B0604030504040204" pitchFamily="34" charset="0"/>
+                <a:cs typeface="Verdana" panose="020B0604030504040204" pitchFamily="34" charset="0"/>
+              </a:rPr>
+              <a:t>” or “-</a:t>
+            </a:r>
+            <a:r>
+              <a:rPr lang="en-IN" sz="1400" dirty="0" err="1" smtClean="0">
+                <a:latin typeface="Verdana" panose="020B0604030504040204" pitchFamily="34" charset="0"/>
+                <a:ea typeface="Verdana" panose="020B0604030504040204" pitchFamily="34" charset="0"/>
+                <a:cs typeface="Verdana" panose="020B0604030504040204" pitchFamily="34" charset="0"/>
+              </a:rPr>
+              <a:t>classpath</a:t>
+            </a:r>
+            <a:r>
+              <a:rPr lang="en-IN" sz="1400" dirty="0" smtClean="0">
+                <a:latin typeface="Verdana" panose="020B0604030504040204" pitchFamily="34" charset="0"/>
+                <a:ea typeface="Verdana" panose="020B0604030504040204" pitchFamily="34" charset="0"/>
+                <a:cs typeface="Verdana" panose="020B0604030504040204" pitchFamily="34" charset="0"/>
+              </a:rPr>
+              <a:t>”</a:t>
+            </a:r>
+          </a:p>
+          <a:p>
+            <a:pPr marL="342900" indent="-342900">
+              <a:buFont typeface="+mj-lt"/>
+              <a:buAutoNum type="arabicPeriod"/>
+            </a:pPr>
+            <a:r>
+              <a:rPr lang="en-IN" sz="1400" dirty="0" smtClean="0">
+                <a:latin typeface="Verdana" panose="020B0604030504040204" pitchFamily="34" charset="0"/>
+                <a:ea typeface="Verdana" panose="020B0604030504040204" pitchFamily="34" charset="0"/>
+                <a:cs typeface="Verdana" panose="020B0604030504040204" pitchFamily="34" charset="0"/>
+              </a:rPr>
+              <a:t>Using “Set </a:t>
+            </a:r>
+            <a:r>
+              <a:rPr lang="en-IN" sz="1400" dirty="0" err="1" smtClean="0">
+                <a:latin typeface="Verdana" panose="020B0604030504040204" pitchFamily="34" charset="0"/>
+                <a:ea typeface="Verdana" panose="020B0604030504040204" pitchFamily="34" charset="0"/>
+                <a:cs typeface="Verdana" panose="020B0604030504040204" pitchFamily="34" charset="0"/>
+              </a:rPr>
+              <a:t>Classpath</a:t>
+            </a:r>
+            <a:r>
+              <a:rPr lang="en-IN" sz="1400" dirty="0" smtClean="0">
+                <a:latin typeface="Verdana" panose="020B0604030504040204" pitchFamily="34" charset="0"/>
+                <a:ea typeface="Verdana" panose="020B0604030504040204" pitchFamily="34" charset="0"/>
+                <a:cs typeface="Verdana" panose="020B0604030504040204" pitchFamily="34" charset="0"/>
+              </a:rPr>
+              <a:t>” command</a:t>
+            </a:r>
+          </a:p>
+          <a:p>
+            <a:pPr marL="342900" indent="-342900">
+              <a:buFont typeface="+mj-lt"/>
+              <a:buAutoNum type="arabicPeriod"/>
+            </a:pPr>
+            <a:r>
+              <a:rPr lang="en-IN" sz="1400" dirty="0" smtClean="0">
+                <a:latin typeface="Verdana" panose="020B0604030504040204" pitchFamily="34" charset="0"/>
+                <a:ea typeface="Verdana" panose="020B0604030504040204" pitchFamily="34" charset="0"/>
+                <a:cs typeface="Verdana" panose="020B0604030504040204" pitchFamily="34" charset="0"/>
+              </a:rPr>
+              <a:t>Using “Environment Variable window”</a:t>
+            </a:r>
+          </a:p>
+          <a:p>
+            <a:endParaRPr lang="en-IN" sz="1400" dirty="0">
+              <a:latin typeface="Verdana" panose="020B0604030504040204" pitchFamily="34" charset="0"/>
+              <a:ea typeface="Verdana" panose="020B0604030504040204" pitchFamily="34" charset="0"/>
+              <a:cs typeface="Verdana" panose="020B0604030504040204" pitchFamily="34" charset="0"/>
+            </a:endParaRPr>
+          </a:p>
+          <a:p>
+            <a:pPr marL="0" indent="0">
+              <a:buNone/>
+            </a:pPr>
+            <a:endParaRPr lang="en-IN" sz="1400" b="1" i="1" dirty="0">
+              <a:latin typeface="Verdana" panose="020B0604030504040204" pitchFamily="34" charset="0"/>
+              <a:ea typeface="Verdana" panose="020B0604030504040204" pitchFamily="34" charset="0"/>
+              <a:cs typeface="Verdana" panose="020B0604030504040204" pitchFamily="34" charset="0"/>
+            </a:endParaRPr>
+          </a:p>
+        </p:txBody>
+      </p:sp>
+    </p:spTree>
+    <p:extLst>
+      <p:ext uri="{BB962C8B-B14F-4D97-AF65-F5344CB8AC3E}">
+        <p14:creationId xmlns:p14="http://schemas.microsoft.com/office/powerpoint/2010/main" val="1509244409"/>
+      </p:ext>
+    </p:extLst>
+  </p:cSld>
+  <p:clrMapOvr>
+    <a:masterClrMapping/>
+  </p:clrMapOvr>
+  <p:timing>
+    <p:tnLst>
+      <p:par>
+        <p:cTn id="1" dur="indefinite" restart="never" nodeType="tmRoot"/>
+      </p:par>
+    </p:tnLst>
+  </p:timing>
+</p:sld>
+</file>
+
+<file path=ppt/slides/slide21.xml><?xml version="1.0" encoding="utf-8"?>
+<p:sld xmlns:a="http://schemas.openxmlformats.org/drawingml/2006/main" xmlns:r="http://schemas.openxmlformats.org/officeDocument/2006/relationships" xmlns:p="http://schemas.openxmlformats.org/presentationml/2006/main">
+  <p:cSld>
+    <p:spTree>
+      <p:nvGrpSpPr>
+        <p:cNvPr id="1" name=""/>
+        <p:cNvGrpSpPr/>
+        <p:nvPr/>
+      </p:nvGrpSpPr>
+      <p:grpSpPr>
+        <a:xfrm>
+          <a:off x="0" y="0"/>
+          <a:ext cx="0" cy="0"/>
+          <a:chOff x="0" y="0"/>
+          <a:chExt cx="0" cy="0"/>
+        </a:xfrm>
+      </p:grpSpPr>
+      <p:sp>
+        <p:nvSpPr>
+          <p:cNvPr id="3" name="Content Placeholder 2"/>
+          <p:cNvSpPr>
+            <a:spLocks noGrp="1"/>
+          </p:cNvSpPr>
+          <p:nvPr>
+            <p:ph idx="1"/>
+          </p:nvPr>
+        </p:nvSpPr>
+        <p:spPr>
+          <a:xfrm>
+            <a:off x="838200" y="191069"/>
+            <a:ext cx="10515600" cy="5985894"/>
+          </a:xfrm>
+        </p:spPr>
+        <p:txBody>
+          <a:bodyPr>
+            <a:normAutofit/>
+          </a:bodyPr>
+          <a:lstStyle/>
+          <a:p>
+            <a:r>
+              <a:rPr lang="en-IN" sz="1400" b="1" dirty="0" smtClean="0">
+                <a:latin typeface="Verdana" panose="020B0604030504040204" pitchFamily="34" charset="0"/>
+                <a:ea typeface="Verdana" panose="020B0604030504040204" pitchFamily="34" charset="0"/>
+                <a:cs typeface="Verdana" panose="020B0604030504040204" pitchFamily="34" charset="0"/>
+              </a:rPr>
+              <a:t>import keyword: </a:t>
+            </a:r>
+            <a:r>
+              <a:rPr lang="en-IN" sz="1400" dirty="0" smtClean="0">
+                <a:latin typeface="Verdana" panose="020B0604030504040204" pitchFamily="34" charset="0"/>
+                <a:ea typeface="Verdana" panose="020B0604030504040204" pitchFamily="34" charset="0"/>
+                <a:cs typeface="Verdana" panose="020B0604030504040204" pitchFamily="34" charset="0"/>
+              </a:rPr>
+              <a:t>this is used to access other package members from this package classes.</a:t>
+            </a:r>
+          </a:p>
+          <a:p>
+            <a:pPr marL="0" indent="0">
+              <a:buNone/>
+            </a:pPr>
+            <a:r>
+              <a:rPr lang="en-IN" sz="1400" b="1" i="1" dirty="0" smtClean="0">
+                <a:latin typeface="Verdana" panose="020B0604030504040204" pitchFamily="34" charset="0"/>
+                <a:ea typeface="Verdana" panose="020B0604030504040204" pitchFamily="34" charset="0"/>
+                <a:cs typeface="Verdana" panose="020B0604030504040204" pitchFamily="34" charset="0"/>
+              </a:rPr>
+              <a:t>Syntax:</a:t>
+            </a:r>
+          </a:p>
+          <a:p>
+            <a:pPr marL="0" indent="0">
+              <a:buNone/>
+            </a:pPr>
+            <a:endParaRPr lang="en-IN" sz="1400" dirty="0" smtClean="0">
+              <a:latin typeface="Verdana" panose="020B0604030504040204" pitchFamily="34" charset="0"/>
+              <a:ea typeface="Verdana" panose="020B0604030504040204" pitchFamily="34" charset="0"/>
+              <a:cs typeface="Verdana" panose="020B0604030504040204" pitchFamily="34" charset="0"/>
+            </a:endParaRPr>
+          </a:p>
+          <a:p>
+            <a:pPr marL="0" indent="0">
+              <a:buNone/>
+            </a:pPr>
+            <a:endParaRPr lang="en-IN" sz="1400" dirty="0" smtClean="0">
+              <a:latin typeface="Verdana" panose="020B0604030504040204" pitchFamily="34" charset="0"/>
+              <a:ea typeface="Verdana" panose="020B0604030504040204" pitchFamily="34" charset="0"/>
+              <a:cs typeface="Verdana" panose="020B0604030504040204" pitchFamily="34" charset="0"/>
+            </a:endParaRPr>
+          </a:p>
+          <a:p>
+            <a:r>
+              <a:rPr lang="en-IN" sz="1400" dirty="0" smtClean="0">
+                <a:latin typeface="Verdana" panose="020B0604030504040204" pitchFamily="34" charset="0"/>
+                <a:ea typeface="Verdana" panose="020B0604030504040204" pitchFamily="34" charset="0"/>
+                <a:cs typeface="Verdana" panose="020B0604030504040204" pitchFamily="34" charset="0"/>
+              </a:rPr>
+              <a:t>First syntax allows compiler and JVM to access all public members (classes, interfaces &amp; </a:t>
+            </a:r>
+            <a:r>
+              <a:rPr lang="en-IN" sz="1400" dirty="0" err="1" smtClean="0">
+                <a:latin typeface="Verdana" panose="020B0604030504040204" pitchFamily="34" charset="0"/>
+                <a:ea typeface="Verdana" panose="020B0604030504040204" pitchFamily="34" charset="0"/>
+                <a:cs typeface="Verdana" panose="020B0604030504040204" pitchFamily="34" charset="0"/>
+              </a:rPr>
+              <a:t>enums</a:t>
+            </a:r>
+            <a:r>
+              <a:rPr lang="en-IN" sz="1400" dirty="0" smtClean="0">
+                <a:latin typeface="Verdana" panose="020B0604030504040204" pitchFamily="34" charset="0"/>
+                <a:ea typeface="Verdana" panose="020B0604030504040204" pitchFamily="34" charset="0"/>
+                <a:cs typeface="Verdana" panose="020B0604030504040204" pitchFamily="34" charset="0"/>
+              </a:rPr>
+              <a:t>) of that imported package, whereas second syntax allows compiler and JVM to access only that imported class.</a:t>
+            </a:r>
+          </a:p>
+          <a:p>
+            <a:r>
+              <a:rPr lang="en-IN" sz="1400" b="1" dirty="0" smtClean="0">
+                <a:latin typeface="Verdana" panose="020B0604030504040204" pitchFamily="34" charset="0"/>
+                <a:ea typeface="Verdana" panose="020B0604030504040204" pitchFamily="34" charset="0"/>
+                <a:cs typeface="Verdana" panose="020B0604030504040204" pitchFamily="34" charset="0"/>
+              </a:rPr>
+              <a:t>Rule: </a:t>
+            </a:r>
+            <a:r>
+              <a:rPr lang="en-IN" sz="1400" dirty="0" smtClean="0">
+                <a:latin typeface="Verdana" panose="020B0604030504040204" pitchFamily="34" charset="0"/>
+                <a:ea typeface="Verdana" panose="020B0604030504040204" pitchFamily="34" charset="0"/>
+                <a:cs typeface="Verdana" panose="020B0604030504040204" pitchFamily="34" charset="0"/>
+              </a:rPr>
+              <a:t>import statement must be placed before all class definitions and after package statement.</a:t>
+            </a:r>
+          </a:p>
+          <a:p>
+            <a:r>
+              <a:rPr lang="en-IN" sz="1400" b="1" dirty="0" smtClean="0">
+                <a:latin typeface="Verdana" panose="020B0604030504040204" pitchFamily="34" charset="0"/>
+                <a:ea typeface="Verdana" panose="020B0604030504040204" pitchFamily="34" charset="0"/>
+                <a:cs typeface="Verdana" panose="020B0604030504040204" pitchFamily="34" charset="0"/>
+              </a:rPr>
+              <a:t>static import: </a:t>
+            </a:r>
+            <a:r>
+              <a:rPr lang="en-IN" sz="1400" dirty="0" smtClean="0">
+                <a:latin typeface="Verdana" panose="020B0604030504040204" pitchFamily="34" charset="0"/>
+                <a:ea typeface="Verdana" panose="020B0604030504040204" pitchFamily="34" charset="0"/>
+                <a:cs typeface="Verdana" panose="020B0604030504040204" pitchFamily="34" charset="0"/>
+              </a:rPr>
+              <a:t>this feature is introduced in Java 5 to import static members of a class.</a:t>
+            </a:r>
+          </a:p>
+          <a:p>
+            <a:r>
+              <a:rPr lang="en-IN" sz="1400" dirty="0" smtClean="0">
+                <a:latin typeface="Verdana" panose="020B0604030504040204" pitchFamily="34" charset="0"/>
+                <a:ea typeface="Verdana" panose="020B0604030504040204" pitchFamily="34" charset="0"/>
+                <a:cs typeface="Verdana" panose="020B0604030504040204" pitchFamily="34" charset="0"/>
+              </a:rPr>
+              <a:t>By using this feature we can access all</a:t>
+            </a:r>
+          </a:p>
+          <a:p>
+            <a:pPr marL="342900" indent="-342900">
+              <a:buFont typeface="+mj-lt"/>
+              <a:buAutoNum type="arabicPeriod"/>
+            </a:pPr>
+            <a:r>
+              <a:rPr lang="en-IN" sz="1400" dirty="0" smtClean="0">
+                <a:latin typeface="Verdana" panose="020B0604030504040204" pitchFamily="34" charset="0"/>
+                <a:ea typeface="Verdana" panose="020B0604030504040204" pitchFamily="34" charset="0"/>
+                <a:cs typeface="Verdana" panose="020B0604030504040204" pitchFamily="34" charset="0"/>
+              </a:rPr>
+              <a:t>non-static members without using class name from other classes with in the package and</a:t>
+            </a:r>
+          </a:p>
+          <a:p>
+            <a:pPr marL="342900" indent="-342900">
+              <a:buFont typeface="+mj-lt"/>
+              <a:buAutoNum type="arabicPeriod"/>
+            </a:pPr>
+            <a:r>
+              <a:rPr lang="en-IN" sz="1400" dirty="0" smtClean="0">
+                <a:latin typeface="Verdana" panose="020B0604030504040204" pitchFamily="34" charset="0"/>
+                <a:ea typeface="Verdana" panose="020B0604030504040204" pitchFamily="34" charset="0"/>
+                <a:cs typeface="Verdana" panose="020B0604030504040204" pitchFamily="34" charset="0"/>
+              </a:rPr>
+              <a:t>protected and public members form outside package class members without using class name.</a:t>
+            </a:r>
+          </a:p>
+          <a:p>
+            <a:pPr marL="0" indent="0">
+              <a:buNone/>
+            </a:pPr>
+            <a:r>
+              <a:rPr lang="en-IN" sz="1400" b="1" i="1" dirty="0" smtClean="0">
+                <a:latin typeface="Verdana" panose="020B0604030504040204" pitchFamily="34" charset="0"/>
+                <a:ea typeface="Verdana" panose="020B0604030504040204" pitchFamily="34" charset="0"/>
+                <a:cs typeface="Verdana" panose="020B0604030504040204" pitchFamily="34" charset="0"/>
+              </a:rPr>
+              <a:t>Syntax:</a:t>
+            </a:r>
+          </a:p>
+          <a:p>
+            <a:pPr marL="0" indent="0">
+              <a:buNone/>
+            </a:pPr>
+            <a:endParaRPr lang="en-IN" sz="1400" dirty="0" smtClean="0">
+              <a:latin typeface="Verdana" panose="020B0604030504040204" pitchFamily="34" charset="0"/>
+              <a:ea typeface="Verdana" panose="020B0604030504040204" pitchFamily="34" charset="0"/>
+              <a:cs typeface="Verdana" panose="020B0604030504040204" pitchFamily="34" charset="0"/>
+            </a:endParaRPr>
+          </a:p>
+          <a:p>
+            <a:pPr marL="0" indent="0">
+              <a:buNone/>
+            </a:pPr>
+            <a:endParaRPr lang="en-IN" sz="1400" dirty="0">
+              <a:latin typeface="Verdana" panose="020B0604030504040204" pitchFamily="34" charset="0"/>
+              <a:ea typeface="Verdana" panose="020B0604030504040204" pitchFamily="34" charset="0"/>
+              <a:cs typeface="Verdana" panose="020B0604030504040204" pitchFamily="34" charset="0"/>
+            </a:endParaRPr>
+          </a:p>
+          <a:p>
+            <a:pPr marL="0" indent="0">
+              <a:buNone/>
+            </a:pPr>
+            <a:endParaRPr lang="en-IN" sz="1400" dirty="0" smtClean="0">
+              <a:latin typeface="Verdana" panose="020B0604030504040204" pitchFamily="34" charset="0"/>
+              <a:ea typeface="Verdana" panose="020B0604030504040204" pitchFamily="34" charset="0"/>
+              <a:cs typeface="Verdana" panose="020B0604030504040204" pitchFamily="34" charset="0"/>
+            </a:endParaRPr>
+          </a:p>
+          <a:p>
+            <a:pPr marL="0" indent="0">
+              <a:buNone/>
+            </a:pPr>
+            <a:endParaRPr lang="en-IN" sz="1400" dirty="0" smtClean="0">
+              <a:latin typeface="Verdana" panose="020B0604030504040204" pitchFamily="34" charset="0"/>
+              <a:ea typeface="Verdana" panose="020B0604030504040204" pitchFamily="34" charset="0"/>
+              <a:cs typeface="Verdana" panose="020B0604030504040204" pitchFamily="34" charset="0"/>
+            </a:endParaRPr>
+          </a:p>
+        </p:txBody>
+      </p:sp>
+      <p:graphicFrame>
+        <p:nvGraphicFramePr>
+          <p:cNvPr id="5" name="Table 4"/>
+          <p:cNvGraphicFramePr>
+            <a:graphicFrameLocks noGrp="1"/>
+          </p:cNvGraphicFramePr>
+          <p:nvPr>
+            <p:extLst/>
+          </p:nvPr>
+        </p:nvGraphicFramePr>
+        <p:xfrm>
+          <a:off x="1029268" y="818866"/>
+          <a:ext cx="7514230" cy="518160"/>
+        </p:xfrm>
+        <a:graphic>
+          <a:graphicData uri="http://schemas.openxmlformats.org/drawingml/2006/table">
+            <a:tbl>
+              <a:tblPr firstRow="1" bandRow="1">
+                <a:tableStyleId>{00A15C55-8517-42AA-B614-E9B94910E393}</a:tableStyleId>
+              </a:tblPr>
+              <a:tblGrid>
+                <a:gridCol w="7514230"/>
+              </a:tblGrid>
+              <a:tr h="504967">
+                <a:tc>
+                  <a:txBody>
+                    <a:bodyPr/>
+                    <a:lstStyle/>
+                    <a:p>
+                      <a:r>
+                        <a:rPr lang="en-IN" sz="1400" b="0" baseline="0" dirty="0" smtClean="0">
+                          <a:solidFill>
+                            <a:schemeClr val="tx1"/>
+                          </a:solidFill>
+                          <a:latin typeface="Verdana" panose="020B0604030504040204" pitchFamily="34" charset="0"/>
+                          <a:ea typeface="Verdana" panose="020B0604030504040204" pitchFamily="34" charset="0"/>
+                          <a:cs typeface="Verdana" panose="020B0604030504040204" pitchFamily="34" charset="0"/>
+                        </a:rPr>
+                        <a:t>import </a:t>
+                      </a:r>
+                      <a:r>
+                        <a:rPr lang="en-IN" sz="1400" b="0" baseline="0" dirty="0" err="1" smtClean="0">
+                          <a:solidFill>
+                            <a:schemeClr val="tx1"/>
+                          </a:solidFill>
+                          <a:latin typeface="Verdana" panose="020B0604030504040204" pitchFamily="34" charset="0"/>
+                          <a:ea typeface="Verdana" panose="020B0604030504040204" pitchFamily="34" charset="0"/>
+                          <a:cs typeface="Verdana" panose="020B0604030504040204" pitchFamily="34" charset="0"/>
+                        </a:rPr>
+                        <a:t>packagename</a:t>
+                      </a:r>
+                      <a:r>
+                        <a:rPr lang="en-IN" sz="1400" b="0" baseline="0" dirty="0" smtClean="0">
+                          <a:solidFill>
+                            <a:schemeClr val="tx1"/>
+                          </a:solidFill>
+                          <a:latin typeface="Verdana" panose="020B0604030504040204" pitchFamily="34" charset="0"/>
+                          <a:ea typeface="Verdana" panose="020B0604030504040204" pitchFamily="34" charset="0"/>
+                          <a:cs typeface="Verdana" panose="020B0604030504040204" pitchFamily="34" charset="0"/>
+                        </a:rPr>
+                        <a:t>.*;</a:t>
+                      </a:r>
+                    </a:p>
+                    <a:p>
+                      <a:r>
+                        <a:rPr lang="en-IN" sz="1400" b="0" baseline="0" dirty="0" smtClean="0">
+                          <a:solidFill>
+                            <a:schemeClr val="tx1"/>
+                          </a:solidFill>
+                          <a:latin typeface="Verdana" panose="020B0604030504040204" pitchFamily="34" charset="0"/>
+                          <a:ea typeface="Verdana" panose="020B0604030504040204" pitchFamily="34" charset="0"/>
+                          <a:cs typeface="Verdana" panose="020B0604030504040204" pitchFamily="34" charset="0"/>
+                        </a:rPr>
+                        <a:t>import </a:t>
+                      </a:r>
+                      <a:r>
+                        <a:rPr lang="en-IN" sz="1400" b="0" baseline="0" dirty="0" err="1" smtClean="0">
+                          <a:solidFill>
+                            <a:schemeClr val="tx1"/>
+                          </a:solidFill>
+                          <a:latin typeface="Verdana" panose="020B0604030504040204" pitchFamily="34" charset="0"/>
+                          <a:ea typeface="Verdana" panose="020B0604030504040204" pitchFamily="34" charset="0"/>
+                          <a:cs typeface="Verdana" panose="020B0604030504040204" pitchFamily="34" charset="0"/>
+                        </a:rPr>
+                        <a:t>packagename.classname</a:t>
+                      </a:r>
+                      <a:r>
+                        <a:rPr lang="en-IN" sz="1400" b="0" baseline="0" dirty="0" smtClean="0">
+                          <a:solidFill>
+                            <a:schemeClr val="tx1"/>
+                          </a:solidFill>
+                          <a:latin typeface="Verdana" panose="020B0604030504040204" pitchFamily="34" charset="0"/>
+                          <a:ea typeface="Verdana" panose="020B0604030504040204" pitchFamily="34" charset="0"/>
+                          <a:cs typeface="Verdana" panose="020B0604030504040204" pitchFamily="34" charset="0"/>
+                        </a:rPr>
+                        <a:t>;</a:t>
+                      </a:r>
+                      <a:endParaRPr lang="en-IN" sz="1400" b="0" baseline="0" dirty="0" smtClean="0">
+                        <a:solidFill>
+                          <a:schemeClr val="tx1"/>
+                        </a:solidFill>
+                        <a:latin typeface="Verdana" panose="020B0604030504040204" pitchFamily="34" charset="0"/>
+                        <a:ea typeface="Verdana" panose="020B0604030504040204" pitchFamily="34" charset="0"/>
+                        <a:cs typeface="Verdana" panose="020B0604030504040204" pitchFamily="34" charset="0"/>
+                      </a:endParaRPr>
+                    </a:p>
+                  </a:txBody>
+                  <a:tcPr/>
+                </a:tc>
+              </a:tr>
+            </a:tbl>
+          </a:graphicData>
+        </a:graphic>
+      </p:graphicFrame>
+      <p:graphicFrame>
+        <p:nvGraphicFramePr>
+          <p:cNvPr id="7" name="Table 6"/>
+          <p:cNvGraphicFramePr>
+            <a:graphicFrameLocks noGrp="1"/>
+          </p:cNvGraphicFramePr>
+          <p:nvPr>
+            <p:extLst/>
+          </p:nvPr>
+        </p:nvGraphicFramePr>
+        <p:xfrm>
+          <a:off x="1045191" y="3870126"/>
+          <a:ext cx="7514230" cy="518160"/>
+        </p:xfrm>
+        <a:graphic>
+          <a:graphicData uri="http://schemas.openxmlformats.org/drawingml/2006/table">
+            <a:tbl>
+              <a:tblPr firstRow="1" bandRow="1">
+                <a:tableStyleId>{00A15C55-8517-42AA-B614-E9B94910E393}</a:tableStyleId>
+              </a:tblPr>
+              <a:tblGrid>
+                <a:gridCol w="7514230"/>
+              </a:tblGrid>
+              <a:tr h="0">
+                <a:tc>
+                  <a:txBody>
+                    <a:bodyPr/>
+                    <a:lstStyle/>
+                    <a:p>
+                      <a:r>
+                        <a:rPr lang="en-IN" sz="1400" b="0" baseline="0" dirty="0" smtClean="0">
+                          <a:solidFill>
+                            <a:schemeClr val="tx1"/>
+                          </a:solidFill>
+                          <a:latin typeface="Verdana" panose="020B0604030504040204" pitchFamily="34" charset="0"/>
+                          <a:ea typeface="Verdana" panose="020B0604030504040204" pitchFamily="34" charset="0"/>
+                          <a:cs typeface="Verdana" panose="020B0604030504040204" pitchFamily="34" charset="0"/>
+                        </a:rPr>
+                        <a:t>import static </a:t>
+                      </a:r>
+                      <a:r>
+                        <a:rPr lang="en-IN" sz="1400" b="0" baseline="0" dirty="0" err="1" smtClean="0">
+                          <a:solidFill>
+                            <a:schemeClr val="tx1"/>
+                          </a:solidFill>
+                          <a:latin typeface="Verdana" panose="020B0604030504040204" pitchFamily="34" charset="0"/>
+                          <a:ea typeface="Verdana" panose="020B0604030504040204" pitchFamily="34" charset="0"/>
+                          <a:cs typeface="Verdana" panose="020B0604030504040204" pitchFamily="34" charset="0"/>
+                        </a:rPr>
+                        <a:t>packagename.classname</a:t>
+                      </a:r>
+                      <a:r>
+                        <a:rPr lang="en-IN" sz="1400" b="0" baseline="0" dirty="0" smtClean="0">
+                          <a:solidFill>
+                            <a:schemeClr val="tx1"/>
+                          </a:solidFill>
+                          <a:latin typeface="Verdana" panose="020B0604030504040204" pitchFamily="34" charset="0"/>
+                          <a:ea typeface="Verdana" panose="020B0604030504040204" pitchFamily="34" charset="0"/>
+                          <a:cs typeface="Verdana" panose="020B0604030504040204" pitchFamily="34" charset="0"/>
+                        </a:rPr>
+                        <a:t>.*;</a:t>
+                      </a:r>
+                    </a:p>
+                    <a:p>
+                      <a:r>
+                        <a:rPr lang="en-IN" sz="1400" b="0" baseline="0" dirty="0" smtClean="0">
+                          <a:solidFill>
+                            <a:schemeClr val="tx1"/>
+                          </a:solidFill>
+                          <a:latin typeface="Verdana" panose="020B0604030504040204" pitchFamily="34" charset="0"/>
+                          <a:ea typeface="Verdana" panose="020B0604030504040204" pitchFamily="34" charset="0"/>
+                          <a:cs typeface="Verdana" panose="020B0604030504040204" pitchFamily="34" charset="0"/>
+                        </a:rPr>
+                        <a:t>import </a:t>
+                      </a:r>
+                      <a:r>
+                        <a:rPr lang="en-IN" sz="1400" b="0" baseline="0" dirty="0" err="1" smtClean="0">
+                          <a:solidFill>
+                            <a:schemeClr val="tx1"/>
+                          </a:solidFill>
+                          <a:latin typeface="Verdana" panose="020B0604030504040204" pitchFamily="34" charset="0"/>
+                          <a:ea typeface="Verdana" panose="020B0604030504040204" pitchFamily="34" charset="0"/>
+                          <a:cs typeface="Verdana" panose="020B0604030504040204" pitchFamily="34" charset="0"/>
+                        </a:rPr>
+                        <a:t>packagename.classname.staticmembername</a:t>
+                      </a:r>
+                      <a:r>
+                        <a:rPr lang="en-IN" sz="1400" b="0" baseline="0" dirty="0" smtClean="0">
+                          <a:solidFill>
+                            <a:schemeClr val="tx1"/>
+                          </a:solidFill>
+                          <a:latin typeface="Verdana" panose="020B0604030504040204" pitchFamily="34" charset="0"/>
+                          <a:ea typeface="Verdana" panose="020B0604030504040204" pitchFamily="34" charset="0"/>
+                          <a:cs typeface="Verdana" panose="020B0604030504040204" pitchFamily="34" charset="0"/>
+                        </a:rPr>
+                        <a:t>;</a:t>
+                      </a:r>
+                      <a:endParaRPr lang="en-IN" sz="1400" b="0" baseline="0" dirty="0" smtClean="0">
+                        <a:solidFill>
+                          <a:schemeClr val="tx1"/>
+                        </a:solidFill>
+                        <a:latin typeface="Verdana" panose="020B0604030504040204" pitchFamily="34" charset="0"/>
+                        <a:ea typeface="Verdana" panose="020B0604030504040204" pitchFamily="34" charset="0"/>
+                        <a:cs typeface="Verdana" panose="020B0604030504040204" pitchFamily="34" charset="0"/>
+                      </a:endParaRPr>
+                    </a:p>
+                  </a:txBody>
+                  <a:tcPr/>
+                </a:tc>
+              </a:tr>
+            </a:tbl>
+          </a:graphicData>
+        </a:graphic>
+      </p:graphicFrame>
+    </p:spTree>
+    <p:extLst>
+      <p:ext uri="{BB962C8B-B14F-4D97-AF65-F5344CB8AC3E}">
+        <p14:creationId xmlns:p14="http://schemas.microsoft.com/office/powerpoint/2010/main" val="4053790997"/>
+      </p:ext>
+    </p:extLst>
+  </p:cSld>
+  <p:clrMapOvr>
+    <a:masterClrMapping/>
+  </p:clrMapOvr>
+  <p:timing>
+    <p:tnLst>
+      <p:par>
+        <p:cTn id="1" dur="indefinite" restart="never" nodeType="tmRoot"/>
+      </p:par>
+    </p:tnLst>
+  </p:timing>
+</p:sld>
+</file>
+
+<file path=ppt/slides/slide22.xml><?xml version="1.0" encoding="utf-8"?>
+<p:sld xmlns:a="http://schemas.openxmlformats.org/drawingml/2006/main" xmlns:r="http://schemas.openxmlformats.org/officeDocument/2006/relationships" xmlns:p="http://schemas.openxmlformats.org/presentationml/2006/main">
+  <p:cSld>
+    <p:spTree>
+      <p:nvGrpSpPr>
+        <p:cNvPr id="1" name=""/>
+        <p:cNvGrpSpPr/>
+        <p:nvPr/>
+      </p:nvGrpSpPr>
+      <p:grpSpPr>
+        <a:xfrm>
+          <a:off x="0" y="0"/>
+          <a:ext cx="0" cy="0"/>
+          <a:chOff x="0" y="0"/>
+          <a:chExt cx="0" cy="0"/>
+        </a:xfrm>
+      </p:grpSpPr>
+      <p:sp>
+        <p:nvSpPr>
+          <p:cNvPr id="2" name="Title 1"/>
+          <p:cNvSpPr>
+            <a:spLocks noGrp="1"/>
+          </p:cNvSpPr>
+          <p:nvPr>
+            <p:ph type="title"/>
+          </p:nvPr>
+        </p:nvSpPr>
+        <p:spPr/>
+        <p:txBody>
+          <a:bodyPr>
+            <a:normAutofit/>
+          </a:bodyPr>
+          <a:lstStyle/>
+          <a:p>
+            <a:r>
+              <a:rPr lang="en-IN" sz="2000" dirty="0" smtClean="0">
+                <a:latin typeface="Verdana" panose="020B0604030504040204" pitchFamily="34" charset="0"/>
+                <a:ea typeface="Verdana" panose="020B0604030504040204" pitchFamily="34" charset="0"/>
+                <a:cs typeface="Verdana" panose="020B0604030504040204" pitchFamily="34" charset="0"/>
+              </a:rPr>
+              <a:t>Access Modifier</a:t>
+            </a:r>
+            <a:endParaRPr lang="en-IN" sz="2000" dirty="0">
+              <a:latin typeface="Verdana" panose="020B0604030504040204" pitchFamily="34" charset="0"/>
+              <a:ea typeface="Verdana" panose="020B0604030504040204" pitchFamily="34" charset="0"/>
+              <a:cs typeface="Verdana" panose="020B0604030504040204" pitchFamily="34" charset="0"/>
+            </a:endParaRPr>
+          </a:p>
+        </p:txBody>
+      </p:sp>
+      <p:sp>
+        <p:nvSpPr>
+          <p:cNvPr id="3" name="Content Placeholder 2"/>
+          <p:cNvSpPr>
+            <a:spLocks noGrp="1"/>
+          </p:cNvSpPr>
+          <p:nvPr>
+            <p:ph idx="1"/>
+          </p:nvPr>
+        </p:nvSpPr>
+        <p:spPr/>
+        <p:txBody>
+          <a:bodyPr>
+            <a:normAutofit/>
+          </a:bodyPr>
+          <a:lstStyle/>
+          <a:p>
+            <a:r>
+              <a:rPr lang="en-IN" sz="1600" dirty="0" smtClean="0">
+                <a:latin typeface="Verdana" panose="020B0604030504040204" pitchFamily="34" charset="0"/>
+                <a:ea typeface="Verdana" panose="020B0604030504040204" pitchFamily="34" charset="0"/>
+                <a:cs typeface="Verdana" panose="020B0604030504040204" pitchFamily="34" charset="0"/>
+              </a:rPr>
+              <a:t>There are 4 types of access modifiers in Java.</a:t>
+            </a:r>
+          </a:p>
+          <a:p>
+            <a:pPr marL="0" indent="0">
+              <a:buNone/>
+            </a:pPr>
+            <a:r>
+              <a:rPr lang="en-IN" sz="1600" b="1" dirty="0" smtClean="0">
+                <a:latin typeface="Verdana" panose="020B0604030504040204" pitchFamily="34" charset="0"/>
+                <a:ea typeface="Verdana" panose="020B0604030504040204" pitchFamily="34" charset="0"/>
+                <a:cs typeface="Verdana" panose="020B0604030504040204" pitchFamily="34" charset="0"/>
+              </a:rPr>
+              <a:t>private:</a:t>
+            </a:r>
+            <a:r>
+              <a:rPr lang="en-IN" sz="1600" dirty="0" smtClean="0">
+                <a:latin typeface="Verdana" panose="020B0604030504040204" pitchFamily="34" charset="0"/>
+                <a:ea typeface="Verdana" panose="020B0604030504040204" pitchFamily="34" charset="0"/>
+                <a:cs typeface="Verdana" panose="020B0604030504040204" pitchFamily="34" charset="0"/>
+              </a:rPr>
+              <a:t> these members are only accessible within the class.</a:t>
+            </a:r>
+          </a:p>
+          <a:p>
+            <a:pPr marL="0" indent="0">
+              <a:buNone/>
+            </a:pPr>
+            <a:r>
+              <a:rPr lang="en-IN" sz="1600" b="1" dirty="0" smtClean="0">
+                <a:latin typeface="Verdana" panose="020B0604030504040204" pitchFamily="34" charset="0"/>
+                <a:ea typeface="Verdana" panose="020B0604030504040204" pitchFamily="34" charset="0"/>
+                <a:cs typeface="Verdana" panose="020B0604030504040204" pitchFamily="34" charset="0"/>
+              </a:rPr>
+              <a:t>default:</a:t>
+            </a:r>
+            <a:r>
+              <a:rPr lang="en-IN" sz="1600" dirty="0" smtClean="0">
+                <a:latin typeface="Verdana" panose="020B0604030504040204" pitchFamily="34" charset="0"/>
+                <a:ea typeface="Verdana" panose="020B0604030504040204" pitchFamily="34" charset="0"/>
+                <a:cs typeface="Verdana" panose="020B0604030504040204" pitchFamily="34" charset="0"/>
+              </a:rPr>
+              <a:t> Default members with no-access modifier are access or visible within a package only.</a:t>
+            </a:r>
+          </a:p>
+          <a:p>
+            <a:pPr marL="0" indent="0">
+              <a:buNone/>
+            </a:pPr>
+            <a:r>
+              <a:rPr lang="en-IN" sz="1600" b="1" dirty="0">
+                <a:latin typeface="Verdana" panose="020B0604030504040204" pitchFamily="34" charset="0"/>
+                <a:ea typeface="Verdana" panose="020B0604030504040204" pitchFamily="34" charset="0"/>
+                <a:cs typeface="Verdana" panose="020B0604030504040204" pitchFamily="34" charset="0"/>
+              </a:rPr>
+              <a:t>p</a:t>
+            </a:r>
+            <a:r>
+              <a:rPr lang="en-IN" sz="1600" b="1" dirty="0" smtClean="0">
+                <a:latin typeface="Verdana" panose="020B0604030504040204" pitchFamily="34" charset="0"/>
+                <a:ea typeface="Verdana" panose="020B0604030504040204" pitchFamily="34" charset="0"/>
+                <a:cs typeface="Verdana" panose="020B0604030504040204" pitchFamily="34" charset="0"/>
+              </a:rPr>
+              <a:t>rotected:</a:t>
+            </a:r>
+            <a:r>
+              <a:rPr lang="en-IN" sz="1600" dirty="0" smtClean="0">
+                <a:latin typeface="Verdana" panose="020B0604030504040204" pitchFamily="34" charset="0"/>
+                <a:ea typeface="Verdana" panose="020B0604030504040204" pitchFamily="34" charset="0"/>
+                <a:cs typeface="Verdana" panose="020B0604030504040204" pitchFamily="34" charset="0"/>
+              </a:rPr>
+              <a:t> these members can be accessible within package form all classes but from outside package only in subclass that too only by using subclass object.</a:t>
+            </a:r>
+          </a:p>
+          <a:p>
+            <a:pPr marL="0" indent="0">
+              <a:buNone/>
+            </a:pPr>
+            <a:r>
+              <a:rPr lang="en-IN" sz="1600" b="1" dirty="0">
+                <a:latin typeface="Verdana" panose="020B0604030504040204" pitchFamily="34" charset="0"/>
+                <a:ea typeface="Verdana" panose="020B0604030504040204" pitchFamily="34" charset="0"/>
+                <a:cs typeface="Verdana" panose="020B0604030504040204" pitchFamily="34" charset="0"/>
+              </a:rPr>
+              <a:t>p</a:t>
+            </a:r>
+            <a:r>
+              <a:rPr lang="en-IN" sz="1600" b="1" dirty="0" smtClean="0">
+                <a:latin typeface="Verdana" panose="020B0604030504040204" pitchFamily="34" charset="0"/>
+                <a:ea typeface="Verdana" panose="020B0604030504040204" pitchFamily="34" charset="0"/>
+                <a:cs typeface="Verdana" panose="020B0604030504040204" pitchFamily="34" charset="0"/>
+              </a:rPr>
+              <a:t>ublic:</a:t>
+            </a:r>
+            <a:r>
+              <a:rPr lang="en-IN" sz="1600" dirty="0" smtClean="0">
+                <a:latin typeface="Verdana" panose="020B0604030504040204" pitchFamily="34" charset="0"/>
+                <a:ea typeface="Verdana" panose="020B0604030504040204" pitchFamily="34" charset="0"/>
+                <a:cs typeface="Verdana" panose="020B0604030504040204" pitchFamily="34" charset="0"/>
+              </a:rPr>
+              <a:t> These members are accessible form the places of project.</a:t>
+            </a:r>
+            <a:endParaRPr lang="en-IN" sz="1600" dirty="0">
+              <a:latin typeface="Verdana" panose="020B0604030504040204" pitchFamily="34" charset="0"/>
+              <a:ea typeface="Verdana" panose="020B0604030504040204" pitchFamily="34" charset="0"/>
+              <a:cs typeface="Verdana" panose="020B0604030504040204" pitchFamily="34" charset="0"/>
+            </a:endParaRPr>
+          </a:p>
+        </p:txBody>
+      </p:sp>
+    </p:spTree>
+    <p:extLst>
+      <p:ext uri="{BB962C8B-B14F-4D97-AF65-F5344CB8AC3E}">
+        <p14:creationId xmlns:p14="http://schemas.microsoft.com/office/powerpoint/2010/main" val="3504487241"/>
       </p:ext>
     </p:extLst>
   </p:cSld>

</xml_diff>

<commit_message>
non-static members and their execution
</commit_message>
<xml_diff>
--- a/CoreJavaNotes.pptx
+++ b/CoreJavaNotes.pptx
@@ -5,7 +5,7 @@
     <p:sldMasterId id="2147483648" r:id="rId1"/>
   </p:sldMasterIdLst>
   <p:notesMasterIdLst>
-    <p:notesMasterId r:id="rId24"/>
+    <p:notesMasterId r:id="rId28"/>
   </p:notesMasterIdLst>
   <p:sldIdLst>
     <p:sldId id="265" r:id="rId2"/>
@@ -30,6 +30,10 @@
     <p:sldId id="284" r:id="rId21"/>
     <p:sldId id="285" r:id="rId22"/>
     <p:sldId id="286" r:id="rId23"/>
+    <p:sldId id="287" r:id="rId24"/>
+    <p:sldId id="288" r:id="rId25"/>
+    <p:sldId id="289" r:id="rId26"/>
+    <p:sldId id="290" r:id="rId27"/>
   </p:sldIdLst>
   <p:sldSz cx="12192000" cy="6858000"/>
   <p:notesSz cx="6858000" cy="9144000"/>
@@ -657,6 +661,90 @@
     <p:extLst>
       <p:ext uri="{BB962C8B-B14F-4D97-AF65-F5344CB8AC3E}">
         <p14:creationId xmlns:p14="http://schemas.microsoft.com/office/powerpoint/2010/main" val="258090100"/>
+      </p:ext>
+    </p:extLst>
+  </p:cSld>
+  <p:clrMapOvr>
+    <a:masterClrMapping/>
+  </p:clrMapOvr>
+</p:notes>
+</file>
+
+<file path=ppt/notesSlides/notesSlide3.xml><?xml version="1.0" encoding="utf-8"?>
+<p:notes xmlns:a="http://schemas.openxmlformats.org/drawingml/2006/main" xmlns:r="http://schemas.openxmlformats.org/officeDocument/2006/relationships" xmlns:p="http://schemas.openxmlformats.org/presentationml/2006/main">
+  <p:cSld>
+    <p:spTree>
+      <p:nvGrpSpPr>
+        <p:cNvPr id="1" name=""/>
+        <p:cNvGrpSpPr/>
+        <p:nvPr/>
+      </p:nvGrpSpPr>
+      <p:grpSpPr>
+        <a:xfrm>
+          <a:off x="0" y="0"/>
+          <a:ext cx="0" cy="0"/>
+          <a:chOff x="0" y="0"/>
+          <a:chExt cx="0" cy="0"/>
+        </a:xfrm>
+      </p:grpSpPr>
+      <p:sp>
+        <p:nvSpPr>
+          <p:cNvPr id="2" name="Slide Image Placeholder 1"/>
+          <p:cNvSpPr>
+            <a:spLocks noGrp="1" noRot="1" noChangeAspect="1"/>
+          </p:cNvSpPr>
+          <p:nvPr>
+            <p:ph type="sldImg"/>
+          </p:nvPr>
+        </p:nvSpPr>
+        <p:spPr/>
+      </p:sp>
+      <p:sp>
+        <p:nvSpPr>
+          <p:cNvPr id="3" name="Notes Placeholder 2"/>
+          <p:cNvSpPr>
+            <a:spLocks noGrp="1"/>
+          </p:cNvSpPr>
+          <p:nvPr>
+            <p:ph type="body" idx="1"/>
+          </p:nvPr>
+        </p:nvSpPr>
+        <p:spPr/>
+        <p:txBody>
+          <a:bodyPr/>
+          <a:lstStyle/>
+          <a:p>
+            <a:endParaRPr lang="en-IN" dirty="0"/>
+          </a:p>
+        </p:txBody>
+      </p:sp>
+      <p:sp>
+        <p:nvSpPr>
+          <p:cNvPr id="4" name="Slide Number Placeholder 3"/>
+          <p:cNvSpPr>
+            <a:spLocks noGrp="1"/>
+          </p:cNvSpPr>
+          <p:nvPr>
+            <p:ph type="sldNum" sz="quarter" idx="10"/>
+          </p:nvPr>
+        </p:nvSpPr>
+        <p:spPr/>
+        <p:txBody>
+          <a:bodyPr/>
+          <a:lstStyle/>
+          <a:p>
+            <a:fld id="{18249E98-FE98-4860-91D6-62D8ED2E0F89}" type="slidenum">
+              <a:rPr lang="en-IN" smtClean="0"/>
+              <a:t>25</a:t>
+            </a:fld>
+            <a:endParaRPr lang="en-IN"/>
+          </a:p>
+        </p:txBody>
+      </p:sp>
+    </p:spTree>
+    <p:extLst>
+      <p:ext uri="{BB962C8B-B14F-4D97-AF65-F5344CB8AC3E}">
+        <p14:creationId xmlns:p14="http://schemas.microsoft.com/office/powerpoint/2010/main" val="2970260326"/>
       </p:ext>
     </p:extLst>
   </p:cSld>
@@ -14689,14 +14777,6 @@
                         </a:rPr>
                         <a:t>;</a:t>
                       </a:r>
-                      <a:endParaRPr lang="en-IN" sz="1400" b="0" baseline="0" dirty="0" smtClean="0">
-                        <a:solidFill>
-                          <a:schemeClr val="tx1"/>
-                        </a:solidFill>
-                        <a:latin typeface="Verdana" panose="020B0604030504040204" pitchFamily="34" charset="0"/>
-                        <a:ea typeface="Verdana" panose="020B0604030504040204" pitchFamily="34" charset="0"/>
-                        <a:cs typeface="Verdana" panose="020B0604030504040204" pitchFamily="34" charset="0"/>
-                      </a:endParaRPr>
                     </a:p>
                   </a:txBody>
                   <a:tcPr/>
@@ -14803,14 +14883,6 @@
                         </a:rPr>
                         <a:t>;</a:t>
                       </a:r>
-                      <a:endParaRPr lang="en-IN" sz="1400" b="0" baseline="0" dirty="0" smtClean="0">
-                        <a:solidFill>
-                          <a:schemeClr val="tx1"/>
-                        </a:solidFill>
-                        <a:latin typeface="Verdana" panose="020B0604030504040204" pitchFamily="34" charset="0"/>
-                        <a:ea typeface="Verdana" panose="020B0604030504040204" pitchFamily="34" charset="0"/>
-                        <a:cs typeface="Verdana" panose="020B0604030504040204" pitchFamily="34" charset="0"/>
-                      </a:endParaRPr>
                     </a:p>
                   </a:txBody>
                   <a:tcPr/>
@@ -15027,6 +15099,377 @@
     <p:extLst>
       <p:ext uri="{BB962C8B-B14F-4D97-AF65-F5344CB8AC3E}">
         <p14:creationId xmlns:p14="http://schemas.microsoft.com/office/powerpoint/2010/main" val="3504487241"/>
+      </p:ext>
+    </p:extLst>
+  </p:cSld>
+  <p:clrMapOvr>
+    <a:masterClrMapping/>
+  </p:clrMapOvr>
+  <p:timing>
+    <p:tnLst>
+      <p:par>
+        <p:cTn id="1" dur="indefinite" restart="never" nodeType="tmRoot"/>
+      </p:par>
+    </p:tnLst>
+  </p:timing>
+</p:sld>
+</file>
+
+<file path=ppt/slides/slide23.xml><?xml version="1.0" encoding="utf-8"?>
+<p:sld xmlns:a="http://schemas.openxmlformats.org/drawingml/2006/main" xmlns:r="http://schemas.openxmlformats.org/officeDocument/2006/relationships" xmlns:p="http://schemas.openxmlformats.org/presentationml/2006/main">
+  <p:cSld>
+    <p:spTree>
+      <p:nvGrpSpPr>
+        <p:cNvPr id="1" name=""/>
+        <p:cNvGrpSpPr/>
+        <p:nvPr/>
+      </p:nvGrpSpPr>
+      <p:grpSpPr>
+        <a:xfrm>
+          <a:off x="0" y="0"/>
+          <a:ext cx="0" cy="0"/>
+          <a:chOff x="0" y="0"/>
+          <a:chExt cx="0" cy="0"/>
+        </a:xfrm>
+      </p:grpSpPr>
+      <p:pic>
+        <p:nvPicPr>
+          <p:cNvPr id="2" name="Picture 1"/>
+          <p:cNvPicPr>
+            <a:picLocks noChangeAspect="1"/>
+          </p:cNvPicPr>
+          <p:nvPr/>
+        </p:nvPicPr>
+        <p:blipFill>
+          <a:blip r:embed="rId2"/>
+          <a:stretch>
+            <a:fillRect/>
+          </a:stretch>
+        </p:blipFill>
+        <p:spPr>
+          <a:xfrm>
+            <a:off x="2871787" y="1057275"/>
+            <a:ext cx="6448425" cy="4743450"/>
+          </a:xfrm>
+          <a:prstGeom prst="rect">
+            <a:avLst/>
+          </a:prstGeom>
+        </p:spPr>
+      </p:pic>
+    </p:spTree>
+    <p:extLst>
+      <p:ext uri="{BB962C8B-B14F-4D97-AF65-F5344CB8AC3E}">
+        <p14:creationId xmlns:p14="http://schemas.microsoft.com/office/powerpoint/2010/main" val="4275003475"/>
+      </p:ext>
+    </p:extLst>
+  </p:cSld>
+  <p:clrMapOvr>
+    <a:masterClrMapping/>
+  </p:clrMapOvr>
+  <p:timing>
+    <p:tnLst>
+      <p:par>
+        <p:cTn id="1" dur="indefinite" restart="never" nodeType="tmRoot"/>
+      </p:par>
+    </p:tnLst>
+  </p:timing>
+</p:sld>
+</file>
+
+<file path=ppt/slides/slide24.xml><?xml version="1.0" encoding="utf-8"?>
+<p:sld xmlns:a="http://schemas.openxmlformats.org/drawingml/2006/main" xmlns:r="http://schemas.openxmlformats.org/officeDocument/2006/relationships" xmlns:p="http://schemas.openxmlformats.org/presentationml/2006/main">
+  <p:cSld>
+    <p:spTree>
+      <p:nvGrpSpPr>
+        <p:cNvPr id="1" name=""/>
+        <p:cNvGrpSpPr/>
+        <p:nvPr/>
+      </p:nvGrpSpPr>
+      <p:grpSpPr>
+        <a:xfrm>
+          <a:off x="0" y="0"/>
+          <a:ext cx="0" cy="0"/>
+          <a:chOff x="0" y="0"/>
+          <a:chExt cx="0" cy="0"/>
+        </a:xfrm>
+      </p:grpSpPr>
+      <p:pic>
+        <p:nvPicPr>
+          <p:cNvPr id="2" name="Picture 1"/>
+          <p:cNvPicPr>
+            <a:picLocks noChangeAspect="1"/>
+          </p:cNvPicPr>
+          <p:nvPr/>
+        </p:nvPicPr>
+        <p:blipFill>
+          <a:blip r:embed="rId2"/>
+          <a:stretch>
+            <a:fillRect/>
+          </a:stretch>
+        </p:blipFill>
+        <p:spPr>
+          <a:xfrm>
+            <a:off x="3124200" y="1762125"/>
+            <a:ext cx="5943600" cy="3333750"/>
+          </a:xfrm>
+          <a:prstGeom prst="rect">
+            <a:avLst/>
+          </a:prstGeom>
+        </p:spPr>
+      </p:pic>
+    </p:spTree>
+    <p:extLst>
+      <p:ext uri="{BB962C8B-B14F-4D97-AF65-F5344CB8AC3E}">
+        <p14:creationId xmlns:p14="http://schemas.microsoft.com/office/powerpoint/2010/main" val="2398656219"/>
+      </p:ext>
+    </p:extLst>
+  </p:cSld>
+  <p:clrMapOvr>
+    <a:masterClrMapping/>
+  </p:clrMapOvr>
+  <p:timing>
+    <p:tnLst>
+      <p:par>
+        <p:cTn id="1" dur="indefinite" restart="never" nodeType="tmRoot"/>
+      </p:par>
+    </p:tnLst>
+  </p:timing>
+</p:sld>
+</file>
+
+<file path=ppt/slides/slide25.xml><?xml version="1.0" encoding="utf-8"?>
+<p:sld xmlns:a="http://schemas.openxmlformats.org/drawingml/2006/main" xmlns:r="http://schemas.openxmlformats.org/officeDocument/2006/relationships" xmlns:p="http://schemas.openxmlformats.org/presentationml/2006/main">
+  <p:cSld>
+    <p:spTree>
+      <p:nvGrpSpPr>
+        <p:cNvPr id="1" name=""/>
+        <p:cNvGrpSpPr/>
+        <p:nvPr/>
+      </p:nvGrpSpPr>
+      <p:grpSpPr>
+        <a:xfrm>
+          <a:off x="0" y="0"/>
+          <a:ext cx="0" cy="0"/>
+          <a:chOff x="0" y="0"/>
+          <a:chExt cx="0" cy="0"/>
+        </a:xfrm>
+      </p:grpSpPr>
+      <p:sp>
+        <p:nvSpPr>
+          <p:cNvPr id="2" name="Title 1"/>
+          <p:cNvSpPr>
+            <a:spLocks noGrp="1"/>
+          </p:cNvSpPr>
+          <p:nvPr>
+            <p:ph type="title"/>
+          </p:nvPr>
+        </p:nvSpPr>
+        <p:spPr/>
+        <p:txBody>
+          <a:bodyPr>
+            <a:normAutofit/>
+          </a:bodyPr>
+          <a:lstStyle/>
+          <a:p>
+            <a:r>
+              <a:rPr lang="en-IN" sz="2000" dirty="0" smtClean="0">
+                <a:latin typeface="Verdana" panose="020B0604030504040204" pitchFamily="34" charset="0"/>
+                <a:ea typeface="Verdana" panose="020B0604030504040204" pitchFamily="34" charset="0"/>
+                <a:cs typeface="Verdana" panose="020B0604030504040204" pitchFamily="34" charset="0"/>
+              </a:rPr>
+              <a:t>Static member control flow</a:t>
+            </a:r>
+            <a:endParaRPr lang="en-IN" sz="2000" dirty="0">
+              <a:latin typeface="Verdana" panose="020B0604030504040204" pitchFamily="34" charset="0"/>
+              <a:ea typeface="Verdana" panose="020B0604030504040204" pitchFamily="34" charset="0"/>
+              <a:cs typeface="Verdana" panose="020B0604030504040204" pitchFamily="34" charset="0"/>
+            </a:endParaRPr>
+          </a:p>
+        </p:txBody>
+      </p:sp>
+      <p:sp>
+        <p:nvSpPr>
+          <p:cNvPr id="3" name="Content Placeholder 2"/>
+          <p:cNvSpPr>
+            <a:spLocks noGrp="1"/>
+          </p:cNvSpPr>
+          <p:nvPr>
+            <p:ph idx="1"/>
+          </p:nvPr>
+        </p:nvSpPr>
+        <p:spPr/>
+        <p:txBody>
+          <a:bodyPr>
+            <a:normAutofit/>
+          </a:bodyPr>
+          <a:lstStyle/>
+          <a:p>
+            <a:r>
+              <a:rPr lang="en-IN" sz="1400" dirty="0" smtClean="0">
+                <a:latin typeface="Verdana" panose="020B0604030504040204" pitchFamily="34" charset="0"/>
+                <a:ea typeface="Verdana" panose="020B0604030504040204" pitchFamily="34" charset="0"/>
+                <a:cs typeface="Verdana" panose="020B0604030504040204" pitchFamily="34" charset="0"/>
+              </a:rPr>
+              <a:t>JVM identifies SVs, SBs and MM from super class to sub class in the order they are defined from top to bottom,</a:t>
+            </a:r>
+            <a:r>
+              <a:rPr lang="en-IN" sz="1400" dirty="0" smtClean="0">
+                <a:latin typeface="Verdana" panose="020B0604030504040204" pitchFamily="34" charset="0"/>
+                <a:ea typeface="Verdana" panose="020B0604030504040204" pitchFamily="34" charset="0"/>
+                <a:cs typeface="Verdana" panose="020B0604030504040204" pitchFamily="34" charset="0"/>
+              </a:rPr>
+              <a:t> then </a:t>
+            </a:r>
+            <a:endParaRPr lang="en-IN" sz="1400" dirty="0" smtClean="0">
+              <a:latin typeface="Verdana" panose="020B0604030504040204" pitchFamily="34" charset="0"/>
+              <a:ea typeface="Verdana" panose="020B0604030504040204" pitchFamily="34" charset="0"/>
+              <a:cs typeface="Verdana" panose="020B0604030504040204" pitchFamily="34" charset="0"/>
+            </a:endParaRPr>
+          </a:p>
+          <a:p>
+            <a:r>
+              <a:rPr lang="en-IN" sz="1400" dirty="0" smtClean="0">
+                <a:latin typeface="Verdana" panose="020B0604030504040204" pitchFamily="34" charset="0"/>
+                <a:ea typeface="Verdana" panose="020B0604030504040204" pitchFamily="34" charset="0"/>
+                <a:cs typeface="Verdana" panose="020B0604030504040204" pitchFamily="34" charset="0"/>
+              </a:rPr>
+              <a:t>it executes SVs, SBs from super class to sub class in the order they are defined</a:t>
+            </a:r>
+          </a:p>
+          <a:p>
+            <a:r>
+              <a:rPr lang="en-IN" sz="1400" dirty="0" smtClean="0">
+                <a:latin typeface="Verdana" panose="020B0604030504040204" pitchFamily="34" charset="0"/>
+                <a:ea typeface="Verdana" panose="020B0604030504040204" pitchFamily="34" charset="0"/>
+                <a:cs typeface="Verdana" panose="020B0604030504040204" pitchFamily="34" charset="0"/>
+              </a:rPr>
+              <a:t>Finally it executes MM from the current loaded subclass.</a:t>
+            </a:r>
+          </a:p>
+          <a:p>
+            <a:pPr marL="0" indent="0">
+              <a:buNone/>
+            </a:pPr>
+            <a:endParaRPr lang="en-IN" sz="1400" dirty="0">
+              <a:latin typeface="Verdana" panose="020B0604030504040204" pitchFamily="34" charset="0"/>
+              <a:ea typeface="Verdana" panose="020B0604030504040204" pitchFamily="34" charset="0"/>
+              <a:cs typeface="Verdana" panose="020B0604030504040204" pitchFamily="34" charset="0"/>
+            </a:endParaRPr>
+          </a:p>
+        </p:txBody>
+      </p:sp>
+    </p:spTree>
+    <p:extLst>
+      <p:ext uri="{BB962C8B-B14F-4D97-AF65-F5344CB8AC3E}">
+        <p14:creationId xmlns:p14="http://schemas.microsoft.com/office/powerpoint/2010/main" val="3791219022"/>
+      </p:ext>
+    </p:extLst>
+  </p:cSld>
+  <p:clrMapOvr>
+    <a:masterClrMapping/>
+  </p:clrMapOvr>
+  <p:timing>
+    <p:tnLst>
+      <p:par>
+        <p:cTn id="1" dur="indefinite" restart="never" nodeType="tmRoot"/>
+      </p:par>
+    </p:tnLst>
+  </p:timing>
+</p:sld>
+</file>
+
+<file path=ppt/slides/slide26.xml><?xml version="1.0" encoding="utf-8"?>
+<p:sld xmlns:a="http://schemas.openxmlformats.org/drawingml/2006/main" xmlns:r="http://schemas.openxmlformats.org/officeDocument/2006/relationships" xmlns:p="http://schemas.openxmlformats.org/presentationml/2006/main">
+  <p:cSld>
+    <p:spTree>
+      <p:nvGrpSpPr>
+        <p:cNvPr id="1" name=""/>
+        <p:cNvGrpSpPr/>
+        <p:nvPr/>
+      </p:nvGrpSpPr>
+      <p:grpSpPr>
+        <a:xfrm>
+          <a:off x="0" y="0"/>
+          <a:ext cx="0" cy="0"/>
+          <a:chOff x="0" y="0"/>
+          <a:chExt cx="0" cy="0"/>
+        </a:xfrm>
+      </p:grpSpPr>
+      <p:sp>
+        <p:nvSpPr>
+          <p:cNvPr id="2" name="Title 1"/>
+          <p:cNvSpPr>
+            <a:spLocks noGrp="1"/>
+          </p:cNvSpPr>
+          <p:nvPr>
+            <p:ph type="title"/>
+          </p:nvPr>
+        </p:nvSpPr>
+        <p:spPr/>
+        <p:txBody>
+          <a:bodyPr>
+            <a:normAutofit/>
+          </a:bodyPr>
+          <a:lstStyle/>
+          <a:p>
+            <a:r>
+              <a:rPr lang="en-IN" sz="2000" dirty="0" smtClean="0">
+                <a:latin typeface="Verdana" panose="020B0604030504040204" pitchFamily="34" charset="0"/>
+                <a:ea typeface="Verdana" panose="020B0604030504040204" pitchFamily="34" charset="0"/>
+                <a:cs typeface="Verdana" panose="020B0604030504040204" pitchFamily="34" charset="0"/>
+              </a:rPr>
+              <a:t>Non-static members control flow</a:t>
+            </a:r>
+            <a:endParaRPr lang="en-IN" sz="2000" dirty="0">
+              <a:latin typeface="Verdana" panose="020B0604030504040204" pitchFamily="34" charset="0"/>
+              <a:ea typeface="Verdana" panose="020B0604030504040204" pitchFamily="34" charset="0"/>
+              <a:cs typeface="Verdana" panose="020B0604030504040204" pitchFamily="34" charset="0"/>
+            </a:endParaRPr>
+          </a:p>
+        </p:txBody>
+      </p:sp>
+      <p:sp>
+        <p:nvSpPr>
+          <p:cNvPr id="3" name="Content Placeholder 2"/>
+          <p:cNvSpPr>
+            <a:spLocks noGrp="1"/>
+          </p:cNvSpPr>
+          <p:nvPr>
+            <p:ph idx="1"/>
+          </p:nvPr>
+        </p:nvSpPr>
+        <p:spPr/>
+        <p:txBody>
+          <a:bodyPr>
+            <a:normAutofit/>
+          </a:bodyPr>
+          <a:lstStyle/>
+          <a:p>
+            <a:r>
+              <a:rPr lang="en-IN" sz="1400" dirty="0" smtClean="0">
+                <a:latin typeface="Verdana" panose="020B0604030504040204" pitchFamily="34" charset="0"/>
+                <a:ea typeface="Verdana" panose="020B0604030504040204" pitchFamily="34" charset="0"/>
+                <a:cs typeface="Verdana" panose="020B0604030504040204" pitchFamily="34" charset="0"/>
+              </a:rPr>
+              <a:t>JVM identifies NSVs, NSBs, NSMs from Super class to sub class in the order they are defined from top to bottom, then</a:t>
+            </a:r>
+          </a:p>
+          <a:p>
+            <a:r>
+              <a:rPr lang="en-IN" sz="1400" dirty="0" smtClean="0">
+                <a:latin typeface="Verdana" panose="020B0604030504040204" pitchFamily="34" charset="0"/>
+                <a:ea typeface="Verdana" panose="020B0604030504040204" pitchFamily="34" charset="0"/>
+                <a:cs typeface="Verdana" panose="020B0604030504040204" pitchFamily="34" charset="0"/>
+              </a:rPr>
+              <a:t>It executes NSVs, NSBs and invoked constructor from Super class to subclass</a:t>
+            </a:r>
+          </a:p>
+        </p:txBody>
+      </p:sp>
+    </p:spTree>
+    <p:extLst>
+      <p:ext uri="{BB962C8B-B14F-4D97-AF65-F5344CB8AC3E}">
+        <p14:creationId xmlns:p14="http://schemas.microsoft.com/office/powerpoint/2010/main" val="3645702277"/>
       </p:ext>
     </p:extLst>
   </p:cSld>

</xml_diff>

<commit_message>
Abstract Methods,Interface and Enum
</commit_message>
<xml_diff>
--- a/CoreJavaNotes.pptx
+++ b/CoreJavaNotes.pptx
@@ -5,7 +5,7 @@
     <p:sldMasterId id="2147483648" r:id="rId1"/>
   </p:sldMasterIdLst>
   <p:notesMasterIdLst>
-    <p:notesMasterId r:id="rId31"/>
+    <p:notesMasterId r:id="rId34"/>
   </p:notesMasterIdLst>
   <p:sldIdLst>
     <p:sldId id="265" r:id="rId2"/>
@@ -37,6 +37,9 @@
     <p:sldId id="291" r:id="rId28"/>
     <p:sldId id="292" r:id="rId29"/>
     <p:sldId id="293" r:id="rId30"/>
+    <p:sldId id="294" r:id="rId31"/>
+    <p:sldId id="295" r:id="rId32"/>
+    <p:sldId id="296" r:id="rId33"/>
   </p:sldIdLst>
   <p:sldSz cx="12192000" cy="6858000"/>
   <p:notesSz cx="6858000" cy="9144000"/>
@@ -225,7 +228,7 @@
           <a:p>
             <a:fld id="{31A22706-0000-41AF-B6FF-4DE11A567547}" type="datetimeFigureOut">
               <a:rPr lang="en-IN" smtClean="0"/>
-              <a:t>26-01-2021</a:t>
+              <a:t>27-01-2021</a:t>
             </a:fld>
             <a:endParaRPr lang="en-IN"/>
           </a:p>
@@ -888,7 +891,7 @@
           <a:p>
             <a:fld id="{A4F3704B-ED65-4BAA-9587-8FAC4677B14E}" type="datetimeFigureOut">
               <a:rPr lang="en-IN" smtClean="0"/>
-              <a:t>26-01-2021</a:t>
+              <a:t>27-01-2021</a:t>
             </a:fld>
             <a:endParaRPr lang="en-IN"/>
           </a:p>
@@ -1058,7 +1061,7 @@
           <a:p>
             <a:fld id="{A4F3704B-ED65-4BAA-9587-8FAC4677B14E}" type="datetimeFigureOut">
               <a:rPr lang="en-IN" smtClean="0"/>
-              <a:t>26-01-2021</a:t>
+              <a:t>27-01-2021</a:t>
             </a:fld>
             <a:endParaRPr lang="en-IN"/>
           </a:p>
@@ -1238,7 +1241,7 @@
           <a:p>
             <a:fld id="{A4F3704B-ED65-4BAA-9587-8FAC4677B14E}" type="datetimeFigureOut">
               <a:rPr lang="en-IN" smtClean="0"/>
-              <a:t>26-01-2021</a:t>
+              <a:t>27-01-2021</a:t>
             </a:fld>
             <a:endParaRPr lang="en-IN"/>
           </a:p>
@@ -1408,7 +1411,7 @@
           <a:p>
             <a:fld id="{A4F3704B-ED65-4BAA-9587-8FAC4677B14E}" type="datetimeFigureOut">
               <a:rPr lang="en-IN" smtClean="0"/>
-              <a:t>26-01-2021</a:t>
+              <a:t>27-01-2021</a:t>
             </a:fld>
             <a:endParaRPr lang="en-IN"/>
           </a:p>
@@ -1654,7 +1657,7 @@
           <a:p>
             <a:fld id="{A4F3704B-ED65-4BAA-9587-8FAC4677B14E}" type="datetimeFigureOut">
               <a:rPr lang="en-IN" smtClean="0"/>
-              <a:t>26-01-2021</a:t>
+              <a:t>27-01-2021</a:t>
             </a:fld>
             <a:endParaRPr lang="en-IN"/>
           </a:p>
@@ -1886,7 +1889,7 @@
           <a:p>
             <a:fld id="{A4F3704B-ED65-4BAA-9587-8FAC4677B14E}" type="datetimeFigureOut">
               <a:rPr lang="en-IN" smtClean="0"/>
-              <a:t>26-01-2021</a:t>
+              <a:t>27-01-2021</a:t>
             </a:fld>
             <a:endParaRPr lang="en-IN"/>
           </a:p>
@@ -2253,7 +2256,7 @@
           <a:p>
             <a:fld id="{A4F3704B-ED65-4BAA-9587-8FAC4677B14E}" type="datetimeFigureOut">
               <a:rPr lang="en-IN" smtClean="0"/>
-              <a:t>26-01-2021</a:t>
+              <a:t>27-01-2021</a:t>
             </a:fld>
             <a:endParaRPr lang="en-IN"/>
           </a:p>
@@ -2371,7 +2374,7 @@
           <a:p>
             <a:fld id="{A4F3704B-ED65-4BAA-9587-8FAC4677B14E}" type="datetimeFigureOut">
               <a:rPr lang="en-IN" smtClean="0"/>
-              <a:t>26-01-2021</a:t>
+              <a:t>27-01-2021</a:t>
             </a:fld>
             <a:endParaRPr lang="en-IN"/>
           </a:p>
@@ -2466,7 +2469,7 @@
           <a:p>
             <a:fld id="{A4F3704B-ED65-4BAA-9587-8FAC4677B14E}" type="datetimeFigureOut">
               <a:rPr lang="en-IN" smtClean="0"/>
-              <a:t>26-01-2021</a:t>
+              <a:t>27-01-2021</a:t>
             </a:fld>
             <a:endParaRPr lang="en-IN"/>
           </a:p>
@@ -2743,7 +2746,7 @@
           <a:p>
             <a:fld id="{A4F3704B-ED65-4BAA-9587-8FAC4677B14E}" type="datetimeFigureOut">
               <a:rPr lang="en-IN" smtClean="0"/>
-              <a:t>26-01-2021</a:t>
+              <a:t>27-01-2021</a:t>
             </a:fld>
             <a:endParaRPr lang="en-IN"/>
           </a:p>
@@ -2996,7 +2999,7 @@
           <a:p>
             <a:fld id="{A4F3704B-ED65-4BAA-9587-8FAC4677B14E}" type="datetimeFigureOut">
               <a:rPr lang="en-IN" smtClean="0"/>
-              <a:t>26-01-2021</a:t>
+              <a:t>27-01-2021</a:t>
             </a:fld>
             <a:endParaRPr lang="en-IN"/>
           </a:p>
@@ -3209,7 +3212,7 @@
           <a:p>
             <a:fld id="{A4F3704B-ED65-4BAA-9587-8FAC4677B14E}" type="datetimeFigureOut">
               <a:rPr lang="en-IN" smtClean="0"/>
-              <a:t>26-01-2021</a:t>
+              <a:t>27-01-2021</a:t>
             </a:fld>
             <a:endParaRPr lang="en-IN"/>
           </a:p>
@@ -15567,15 +15570,7 @@
                 <a:ea typeface="Verdana" panose="020B0604030504040204" pitchFamily="34" charset="0"/>
                 <a:cs typeface="Verdana" panose="020B0604030504040204" pitchFamily="34" charset="0"/>
               </a:rPr>
-              <a:t>The process of creating a class by hiding internal data from th</a:t>
-            </a:r>
-            <a:r>
-              <a:rPr lang="en-IN" sz="1400" dirty="0" smtClean="0">
-                <a:latin typeface="Verdana" panose="020B0604030504040204" pitchFamily="34" charset="0"/>
-                <a:ea typeface="Verdana" panose="020B0604030504040204" pitchFamily="34" charset="0"/>
-                <a:cs typeface="Verdana" panose="020B0604030504040204" pitchFamily="34" charset="0"/>
-              </a:rPr>
-              <a:t>e outside world/outside class members; and accessing only through publicly exposed methods is known as encapsulation.</a:t>
+              <a:t>The process of creating a class by hiding internal data from the outside world/outside class members; and accessing only through publicly exposed methods is known as encapsulation.</a:t>
             </a:r>
           </a:p>
           <a:p>
@@ -15683,11 +15678,6 @@
               </a:rPr>
               <a:t>Inheritance</a:t>
             </a:r>
-            <a:endParaRPr lang="en-IN" sz="1400" dirty="0" smtClean="0">
-              <a:latin typeface="Verdana" panose="020B0604030504040204" pitchFamily="34" charset="0"/>
-              <a:ea typeface="Verdana" panose="020B0604030504040204" pitchFamily="34" charset="0"/>
-              <a:cs typeface="Verdana" panose="020B0604030504040204" pitchFamily="34" charset="0"/>
-            </a:endParaRPr>
           </a:p>
           <a:p>
             <a:r>
@@ -16162,7 +16152,12 @@
             <p:ph type="title"/>
           </p:nvPr>
         </p:nvSpPr>
-        <p:spPr/>
+        <p:spPr>
+          <a:xfrm>
+            <a:off x="838200" y="365125"/>
+            <a:ext cx="10515600" cy="433365"/>
+          </a:xfrm>
+        </p:spPr>
         <p:txBody>
           <a:bodyPr>
             <a:normAutofit/>
@@ -16195,7 +16190,12 @@
             <p:ph idx="1"/>
           </p:nvPr>
         </p:nvSpPr>
-        <p:spPr/>
+        <p:spPr>
+          <a:xfrm>
+            <a:off x="838200" y="798490"/>
+            <a:ext cx="10515600" cy="5378473"/>
+          </a:xfrm>
+        </p:spPr>
         <p:txBody>
           <a:bodyPr>
             <a:normAutofit/>
@@ -16964,6 +16964,853 @@
     <p:extLst>
       <p:ext uri="{BB962C8B-B14F-4D97-AF65-F5344CB8AC3E}">
         <p14:creationId xmlns:p14="http://schemas.microsoft.com/office/powerpoint/2010/main" val="65909902"/>
+      </p:ext>
+    </p:extLst>
+  </p:cSld>
+  <p:clrMapOvr>
+    <a:masterClrMapping/>
+  </p:clrMapOvr>
+  <p:timing>
+    <p:tnLst>
+      <p:par>
+        <p:cTn id="1" dur="indefinite" restart="never" nodeType="tmRoot"/>
+      </p:par>
+    </p:tnLst>
+  </p:timing>
+</p:sld>
+</file>
+
+<file path=ppt/slides/slide30.xml><?xml version="1.0" encoding="utf-8"?>
+<p:sld xmlns:a="http://schemas.openxmlformats.org/drawingml/2006/main" xmlns:r="http://schemas.openxmlformats.org/officeDocument/2006/relationships" xmlns:p="http://schemas.openxmlformats.org/presentationml/2006/main">
+  <p:cSld>
+    <p:spTree>
+      <p:nvGrpSpPr>
+        <p:cNvPr id="1" name=""/>
+        <p:cNvGrpSpPr/>
+        <p:nvPr/>
+      </p:nvGrpSpPr>
+      <p:grpSpPr>
+        <a:xfrm>
+          <a:off x="0" y="0"/>
+          <a:ext cx="0" cy="0"/>
+          <a:chOff x="0" y="0"/>
+          <a:chExt cx="0" cy="0"/>
+        </a:xfrm>
+      </p:grpSpPr>
+      <p:sp>
+        <p:nvSpPr>
+          <p:cNvPr id="2" name="Title 1"/>
+          <p:cNvSpPr>
+            <a:spLocks noGrp="1"/>
+          </p:cNvSpPr>
+          <p:nvPr>
+            <p:ph type="title"/>
+          </p:nvPr>
+        </p:nvSpPr>
+        <p:spPr>
+          <a:xfrm>
+            <a:off x="838200" y="365126"/>
+            <a:ext cx="10515600" cy="291698"/>
+          </a:xfrm>
+        </p:spPr>
+        <p:txBody>
+          <a:bodyPr>
+            <a:normAutofit fontScale="90000"/>
+          </a:bodyPr>
+          <a:lstStyle/>
+          <a:p>
+            <a:r>
+              <a:rPr lang="en-IN" sz="2000" b="1" dirty="0" smtClean="0">
+                <a:latin typeface="Verdana" panose="020B0604030504040204" pitchFamily="34" charset="0"/>
+                <a:ea typeface="Verdana" panose="020B0604030504040204" pitchFamily="34" charset="0"/>
+                <a:cs typeface="Verdana" panose="020B0604030504040204" pitchFamily="34" charset="0"/>
+              </a:rPr>
+              <a:t>Abstract Method and Abstract Classes</a:t>
+            </a:r>
+            <a:endParaRPr lang="en-IN" sz="2000" b="1" dirty="0">
+              <a:latin typeface="Verdana" panose="020B0604030504040204" pitchFamily="34" charset="0"/>
+              <a:ea typeface="Verdana" panose="020B0604030504040204" pitchFamily="34" charset="0"/>
+              <a:cs typeface="Verdana" panose="020B0604030504040204" pitchFamily="34" charset="0"/>
+            </a:endParaRPr>
+          </a:p>
+        </p:txBody>
+      </p:sp>
+      <p:sp>
+        <p:nvSpPr>
+          <p:cNvPr id="3" name="Content Placeholder 2"/>
+          <p:cNvSpPr>
+            <a:spLocks noGrp="1"/>
+          </p:cNvSpPr>
+          <p:nvPr>
+            <p:ph idx="1"/>
+          </p:nvPr>
+        </p:nvSpPr>
+        <p:spPr>
+          <a:xfrm>
+            <a:off x="838200" y="656824"/>
+            <a:ext cx="10515600" cy="5520139"/>
+          </a:xfrm>
+        </p:spPr>
+        <p:txBody>
+          <a:bodyPr>
+            <a:normAutofit/>
+          </a:bodyPr>
+          <a:lstStyle/>
+          <a:p>
+            <a:r>
+              <a:rPr lang="en-IN" sz="1400" dirty="0" smtClean="0">
+                <a:latin typeface="Verdana" panose="020B0604030504040204" pitchFamily="34" charset="0"/>
+                <a:ea typeface="Verdana" panose="020B0604030504040204" pitchFamily="34" charset="0"/>
+                <a:cs typeface="Verdana" panose="020B0604030504040204" pitchFamily="34" charset="0"/>
+              </a:rPr>
+              <a:t>A method tha</a:t>
+            </a:r>
+            <a:r>
+              <a:rPr lang="en-IN" sz="1400" dirty="0" smtClean="0">
+                <a:latin typeface="Verdana" panose="020B0604030504040204" pitchFamily="34" charset="0"/>
+                <a:ea typeface="Verdana" panose="020B0604030504040204" pitchFamily="34" charset="0"/>
+                <a:cs typeface="Verdana" panose="020B0604030504040204" pitchFamily="34" charset="0"/>
+              </a:rPr>
+              <a:t>t does not have body is called abstract method and a class that is declared as abstract using abstract using abstract keyword is called abstract class.</a:t>
+            </a:r>
+          </a:p>
+          <a:p>
+            <a:r>
+              <a:rPr lang="en-IN" sz="1400" dirty="0" smtClean="0">
+                <a:latin typeface="Verdana" panose="020B0604030504040204" pitchFamily="34" charset="0"/>
+                <a:ea typeface="Verdana" panose="020B0604030504040204" pitchFamily="34" charset="0"/>
+                <a:cs typeface="Verdana" panose="020B0604030504040204" pitchFamily="34" charset="0"/>
+              </a:rPr>
+              <a:t>If a class contains abstract method, it must be declares as abstract.</a:t>
+            </a:r>
+          </a:p>
+          <a:p>
+            <a:r>
+              <a:rPr lang="en-IN" sz="1400" dirty="0" smtClean="0">
+                <a:latin typeface="Verdana" panose="020B0604030504040204" pitchFamily="34" charset="0"/>
+                <a:ea typeface="Verdana" panose="020B0604030504040204" pitchFamily="34" charset="0"/>
+                <a:cs typeface="Verdana" panose="020B0604030504040204" pitchFamily="34" charset="0"/>
+              </a:rPr>
+              <a:t>Abstract class can’t be instantiated because it is not fully implemented class so its abstract method cannot be executed.</a:t>
+            </a:r>
+          </a:p>
+          <a:p>
+            <a:r>
+              <a:rPr lang="en-IN" sz="1400" dirty="0" smtClean="0">
+                <a:latin typeface="Verdana" panose="020B0604030504040204" pitchFamily="34" charset="0"/>
+                <a:ea typeface="Verdana" panose="020B0604030504040204" pitchFamily="34" charset="0"/>
+                <a:cs typeface="Verdana" panose="020B0604030504040204" pitchFamily="34" charset="0"/>
+              </a:rPr>
+              <a:t>Subclass developers provide the implementation for abstract methods according </a:t>
+            </a:r>
+            <a:r>
+              <a:rPr lang="en-IN" sz="1400" dirty="0">
+                <a:latin typeface="Verdana" panose="020B0604030504040204" pitchFamily="34" charset="0"/>
+                <a:ea typeface="Verdana" panose="020B0604030504040204" pitchFamily="34" charset="0"/>
+                <a:cs typeface="Verdana" panose="020B0604030504040204" pitchFamily="34" charset="0"/>
+              </a:rPr>
+              <a:t>t</a:t>
+            </a:r>
+            <a:r>
+              <a:rPr lang="en-IN" sz="1400" dirty="0" smtClean="0">
+                <a:latin typeface="Verdana" panose="020B0604030504040204" pitchFamily="34" charset="0"/>
+                <a:ea typeface="Verdana" panose="020B0604030504040204" pitchFamily="34" charset="0"/>
+                <a:cs typeface="Verdana" panose="020B0604030504040204" pitchFamily="34" charset="0"/>
+              </a:rPr>
+              <a:t>o their business requirement. Basically in projects abstract methods are defined by super class developers, and they are implemented by sub class developers.</a:t>
+            </a:r>
+          </a:p>
+          <a:p>
+            <a:r>
+              <a:rPr lang="en-IN" sz="1400" dirty="0" smtClean="0">
+                <a:latin typeface="Verdana" panose="020B0604030504040204" pitchFamily="34" charset="0"/>
+                <a:ea typeface="Verdana" panose="020B0604030504040204" pitchFamily="34" charset="0"/>
+                <a:cs typeface="Verdana" panose="020B0604030504040204" pitchFamily="34" charset="0"/>
+              </a:rPr>
+              <a:t>We can define all static and non-static members including constructor plus abstract method. So in an abstract class we can define 9 type of members.</a:t>
+            </a:r>
+          </a:p>
+          <a:p>
+            <a:r>
+              <a:rPr lang="en-IN" sz="1400" dirty="0" smtClean="0">
+                <a:latin typeface="Verdana" panose="020B0604030504040204" pitchFamily="34" charset="0"/>
+                <a:ea typeface="Verdana" panose="020B0604030504040204" pitchFamily="34" charset="0"/>
+                <a:cs typeface="Verdana" panose="020B0604030504040204" pitchFamily="34" charset="0"/>
+              </a:rPr>
+              <a:t>Only two modifiers are allowed with abstract:</a:t>
+            </a:r>
+          </a:p>
+          <a:p>
+            <a:pPr marL="342900" indent="-342900">
+              <a:buFont typeface="+mj-lt"/>
+              <a:buAutoNum type="arabicPeriod"/>
+            </a:pPr>
+            <a:r>
+              <a:rPr lang="en-IN" sz="1400" dirty="0">
+                <a:latin typeface="Verdana" panose="020B0604030504040204" pitchFamily="34" charset="0"/>
+                <a:ea typeface="Verdana" panose="020B0604030504040204" pitchFamily="34" charset="0"/>
+                <a:cs typeface="Verdana" panose="020B0604030504040204" pitchFamily="34" charset="0"/>
+              </a:rPr>
+              <a:t>p</a:t>
+            </a:r>
+            <a:r>
+              <a:rPr lang="en-IN" sz="1400" dirty="0" smtClean="0">
+                <a:latin typeface="Verdana" panose="020B0604030504040204" pitchFamily="34" charset="0"/>
+                <a:ea typeface="Verdana" panose="020B0604030504040204" pitchFamily="34" charset="0"/>
+                <a:cs typeface="Verdana" panose="020B0604030504040204" pitchFamily="34" charset="0"/>
+              </a:rPr>
+              <a:t>rotected</a:t>
+            </a:r>
+          </a:p>
+          <a:p>
+            <a:pPr marL="342900" indent="-342900">
+              <a:buFont typeface="+mj-lt"/>
+              <a:buAutoNum type="arabicPeriod"/>
+            </a:pPr>
+            <a:r>
+              <a:rPr lang="en-IN" sz="1400" dirty="0" smtClean="0">
+                <a:latin typeface="Verdana" panose="020B0604030504040204" pitchFamily="34" charset="0"/>
+                <a:ea typeface="Verdana" panose="020B0604030504040204" pitchFamily="34" charset="0"/>
+                <a:cs typeface="Verdana" panose="020B0604030504040204" pitchFamily="34" charset="0"/>
+              </a:rPr>
+              <a:t>public</a:t>
+            </a:r>
+          </a:p>
+          <a:p>
+            <a:r>
+              <a:rPr lang="en-IN" sz="1400" dirty="0" smtClean="0">
+                <a:latin typeface="Verdana" panose="020B0604030504040204" pitchFamily="34" charset="0"/>
+                <a:ea typeface="Verdana" panose="020B0604030504040204" pitchFamily="34" charset="0"/>
+                <a:cs typeface="Verdana" panose="020B0604030504040204" pitchFamily="34" charset="0"/>
+              </a:rPr>
+              <a:t>If we use any other 8 modifiers it leads to CTE: Illegal combination of modifiers</a:t>
+            </a:r>
+          </a:p>
+          <a:p>
+            <a:pPr marL="342900" indent="-342900">
+              <a:buFont typeface="+mj-lt"/>
+              <a:buAutoNum type="arabicPeriod"/>
+            </a:pPr>
+            <a:endParaRPr lang="en-IN" sz="1400" dirty="0" smtClean="0">
+              <a:latin typeface="Verdana" panose="020B0604030504040204" pitchFamily="34" charset="0"/>
+              <a:ea typeface="Verdana" panose="020B0604030504040204" pitchFamily="34" charset="0"/>
+              <a:cs typeface="Verdana" panose="020B0604030504040204" pitchFamily="34" charset="0"/>
+            </a:endParaRPr>
+          </a:p>
+          <a:p>
+            <a:endParaRPr lang="en-IN" sz="1400" dirty="0">
+              <a:latin typeface="Verdana" panose="020B0604030504040204" pitchFamily="34" charset="0"/>
+              <a:ea typeface="Verdana" panose="020B0604030504040204" pitchFamily="34" charset="0"/>
+              <a:cs typeface="Verdana" panose="020B0604030504040204" pitchFamily="34" charset="0"/>
+            </a:endParaRPr>
+          </a:p>
+        </p:txBody>
+      </p:sp>
+    </p:spTree>
+    <p:extLst>
+      <p:ext uri="{BB962C8B-B14F-4D97-AF65-F5344CB8AC3E}">
+        <p14:creationId xmlns:p14="http://schemas.microsoft.com/office/powerpoint/2010/main" val="3956192641"/>
+      </p:ext>
+    </p:extLst>
+  </p:cSld>
+  <p:clrMapOvr>
+    <a:masterClrMapping/>
+  </p:clrMapOvr>
+  <p:timing>
+    <p:tnLst>
+      <p:par>
+        <p:cTn id="1" dur="indefinite" restart="never" nodeType="tmRoot"/>
+      </p:par>
+    </p:tnLst>
+  </p:timing>
+</p:sld>
+</file>
+
+<file path=ppt/slides/slide31.xml><?xml version="1.0" encoding="utf-8"?>
+<p:sld xmlns:a="http://schemas.openxmlformats.org/drawingml/2006/main" xmlns:r="http://schemas.openxmlformats.org/officeDocument/2006/relationships" xmlns:p="http://schemas.openxmlformats.org/presentationml/2006/main">
+  <p:cSld>
+    <p:spTree>
+      <p:nvGrpSpPr>
+        <p:cNvPr id="1" name=""/>
+        <p:cNvGrpSpPr/>
+        <p:nvPr/>
+      </p:nvGrpSpPr>
+      <p:grpSpPr>
+        <a:xfrm>
+          <a:off x="0" y="0"/>
+          <a:ext cx="0" cy="0"/>
+          <a:chOff x="0" y="0"/>
+          <a:chExt cx="0" cy="0"/>
+        </a:xfrm>
+      </p:grpSpPr>
+      <p:sp>
+        <p:nvSpPr>
+          <p:cNvPr id="2" name="Title 1"/>
+          <p:cNvSpPr>
+            <a:spLocks noGrp="1"/>
+          </p:cNvSpPr>
+          <p:nvPr>
+            <p:ph type="title"/>
+          </p:nvPr>
+        </p:nvSpPr>
+        <p:spPr>
+          <a:xfrm>
+            <a:off x="838200" y="365126"/>
+            <a:ext cx="10515600" cy="420486"/>
+          </a:xfrm>
+        </p:spPr>
+        <p:txBody>
+          <a:bodyPr>
+            <a:normAutofit/>
+          </a:bodyPr>
+          <a:lstStyle/>
+          <a:p>
+            <a:r>
+              <a:rPr lang="en-IN" sz="2000" b="1" dirty="0" smtClean="0">
+                <a:latin typeface="Verdana" panose="020B0604030504040204" pitchFamily="34" charset="0"/>
+                <a:ea typeface="Verdana" panose="020B0604030504040204" pitchFamily="34" charset="0"/>
+                <a:cs typeface="Verdana" panose="020B0604030504040204" pitchFamily="34" charset="0"/>
+              </a:rPr>
+              <a:t>Interface</a:t>
+            </a:r>
+            <a:endParaRPr lang="en-IN" sz="2000" b="1" dirty="0">
+              <a:latin typeface="Verdana" panose="020B0604030504040204" pitchFamily="34" charset="0"/>
+              <a:ea typeface="Verdana" panose="020B0604030504040204" pitchFamily="34" charset="0"/>
+              <a:cs typeface="Verdana" panose="020B0604030504040204" pitchFamily="34" charset="0"/>
+            </a:endParaRPr>
+          </a:p>
+        </p:txBody>
+      </p:sp>
+      <p:sp>
+        <p:nvSpPr>
+          <p:cNvPr id="3" name="Content Placeholder 2"/>
+          <p:cNvSpPr>
+            <a:spLocks noGrp="1"/>
+          </p:cNvSpPr>
+          <p:nvPr>
+            <p:ph idx="1"/>
+          </p:nvPr>
+        </p:nvSpPr>
+        <p:spPr>
+          <a:xfrm>
+            <a:off x="838200" y="785612"/>
+            <a:ext cx="10515600" cy="5391351"/>
+          </a:xfrm>
+        </p:spPr>
+        <p:txBody>
+          <a:bodyPr>
+            <a:normAutofit lnSpcReduction="10000"/>
+          </a:bodyPr>
+          <a:lstStyle/>
+          <a:p>
+            <a:r>
+              <a:rPr lang="en-IN" sz="1400" dirty="0" smtClean="0">
+                <a:latin typeface="Verdana" panose="020B0604030504040204" pitchFamily="34" charset="0"/>
+                <a:ea typeface="Verdana" panose="020B0604030504040204" pitchFamily="34" charset="0"/>
+                <a:cs typeface="Verdana" panose="020B0604030504040204" pitchFamily="34" charset="0"/>
+              </a:rPr>
+              <a:t>Interface is fully un-implemented class </a:t>
+            </a:r>
+            <a:r>
+              <a:rPr lang="en-IN" sz="1400" dirty="0" smtClean="0">
+                <a:latin typeface="Verdana" panose="020B0604030504040204" pitchFamily="34" charset="0"/>
+                <a:ea typeface="Verdana" panose="020B0604030504040204" pitchFamily="34" charset="0"/>
+                <a:cs typeface="Verdana" panose="020B0604030504040204" pitchFamily="34" charset="0"/>
+              </a:rPr>
+              <a:t>used for declaring set of operations of an object for developing a loosely coupled runtime polymorphism object class to use these operations form different subclasses of this interface.</a:t>
+            </a:r>
+          </a:p>
+          <a:p>
+            <a:r>
+              <a:rPr lang="en-IN" sz="1400" dirty="0" smtClean="0">
+                <a:latin typeface="Verdana" panose="020B0604030504040204" pitchFamily="34" charset="0"/>
+                <a:ea typeface="Verdana" panose="020B0604030504040204" pitchFamily="34" charset="0"/>
+                <a:cs typeface="Verdana" panose="020B0604030504040204" pitchFamily="34" charset="0"/>
+              </a:rPr>
+              <a:t>We can define only “public static final variables and public abstract methods” for declaring a object operations.</a:t>
+            </a:r>
+          </a:p>
+          <a:p>
+            <a:r>
+              <a:rPr lang="en-IN" sz="1400" dirty="0" smtClean="0">
+                <a:latin typeface="Verdana" panose="020B0604030504040204" pitchFamily="34" charset="0"/>
+                <a:ea typeface="Verdana" panose="020B0604030504040204" pitchFamily="34" charset="0"/>
+                <a:cs typeface="Verdana" panose="020B0604030504040204" pitchFamily="34" charset="0"/>
+              </a:rPr>
+              <a:t>Basically it is used to for developing a specification</a:t>
+            </a:r>
+            <a:r>
+              <a:rPr lang="en-IN" sz="1400" dirty="0" smtClean="0">
+                <a:latin typeface="Verdana" panose="020B0604030504040204" pitchFamily="34" charset="0"/>
+                <a:ea typeface="Verdana" panose="020B0604030504040204" pitchFamily="34" charset="0"/>
+                <a:cs typeface="Verdana" panose="020B0604030504040204" pitchFamily="34" charset="0"/>
+              </a:rPr>
+              <a:t>/contract/guidelines document between service user and service provider to access that objects operations by service user those are implemented by service provider.</a:t>
+            </a:r>
+          </a:p>
+          <a:p>
+            <a:r>
+              <a:rPr lang="en-IN" sz="1400" dirty="0" smtClean="0">
+                <a:latin typeface="Verdana" panose="020B0604030504040204" pitchFamily="34" charset="0"/>
+                <a:ea typeface="Verdana" panose="020B0604030504040204" pitchFamily="34" charset="0"/>
+                <a:cs typeface="Verdana" panose="020B0604030504040204" pitchFamily="34" charset="0"/>
+              </a:rPr>
+              <a:t>Interface can’t have concrete methods.</a:t>
+            </a:r>
+          </a:p>
+          <a:p>
+            <a:r>
+              <a:rPr lang="en-IN" sz="1400" dirty="0" smtClean="0">
+                <a:latin typeface="Verdana" panose="020B0604030504040204" pitchFamily="34" charset="0"/>
+                <a:ea typeface="Verdana" panose="020B0604030504040204" pitchFamily="34" charset="0"/>
+                <a:cs typeface="Verdana" panose="020B0604030504040204" pitchFamily="34" charset="0"/>
+              </a:rPr>
+              <a:t>In interface, we can have only static final variables, even in we create variables as non-static, non-final variable compiler convert it as static, final variables.</a:t>
+            </a:r>
+          </a:p>
+          <a:p>
+            <a:r>
+              <a:rPr lang="en-IN" sz="1400" dirty="0" smtClean="0">
+                <a:latin typeface="Verdana" panose="020B0604030504040204" pitchFamily="34" charset="0"/>
+                <a:ea typeface="Verdana" panose="020B0604030504040204" pitchFamily="34" charset="0"/>
+                <a:cs typeface="Verdana" panose="020B0604030504040204" pitchFamily="34" charset="0"/>
+              </a:rPr>
+              <a:t>We can’t declare interface members as private or protected members.</a:t>
+            </a:r>
+          </a:p>
+          <a:p>
+            <a:r>
+              <a:rPr lang="en-IN" sz="1400" dirty="0" smtClean="0">
+                <a:latin typeface="Verdana" panose="020B0604030504040204" pitchFamily="34" charset="0"/>
+                <a:ea typeface="Verdana" panose="020B0604030504040204" pitchFamily="34" charset="0"/>
+                <a:cs typeface="Verdana" panose="020B0604030504040204" pitchFamily="34" charset="0"/>
+              </a:rPr>
+              <a:t>Interface variables should be initialized at the time of creation because they are final.</a:t>
+            </a:r>
+          </a:p>
+          <a:p>
+            <a:r>
+              <a:rPr lang="en-IN" sz="1400" dirty="0" smtClean="0">
+                <a:latin typeface="Verdana" panose="020B0604030504040204" pitchFamily="34" charset="0"/>
+                <a:ea typeface="Verdana" panose="020B0604030504040204" pitchFamily="34" charset="0"/>
+                <a:cs typeface="Verdana" panose="020B0604030504040204" pitchFamily="34" charset="0"/>
+              </a:rPr>
+              <a:t>Interface can’t be instantiated, but its reference variable can be created for storing its subclass objects references to develop loosely coupled user application to get Runtime polymorphism for executing method from its different subclasses.</a:t>
+            </a:r>
+          </a:p>
+          <a:p>
+            <a:r>
+              <a:rPr lang="en-IN" sz="1400" dirty="0" smtClean="0">
+                <a:latin typeface="Verdana" panose="020B0604030504040204" pitchFamily="34" charset="0"/>
+                <a:ea typeface="Verdana" panose="020B0604030504040204" pitchFamily="34" charset="0"/>
+                <a:cs typeface="Verdana" panose="020B0604030504040204" pitchFamily="34" charset="0"/>
+              </a:rPr>
+              <a:t>We cannot declare interface as final.</a:t>
+            </a:r>
+          </a:p>
+          <a:p>
+            <a:r>
+              <a:rPr lang="en-IN" sz="1400" dirty="0" smtClean="0">
+                <a:latin typeface="Verdana" panose="020B0604030504040204" pitchFamily="34" charset="0"/>
+                <a:ea typeface="Verdana" panose="020B0604030504040204" pitchFamily="34" charset="0"/>
+                <a:cs typeface="Verdana" panose="020B0604030504040204" pitchFamily="34" charset="0"/>
+              </a:rPr>
+              <a:t>We can declare interface as abstract, it is optional and </a:t>
+            </a:r>
+            <a:r>
+              <a:rPr lang="en-IN" sz="1400" dirty="0" smtClean="0">
+                <a:latin typeface="Verdana" panose="020B0604030504040204" pitchFamily="34" charset="0"/>
+                <a:ea typeface="Verdana" panose="020B0604030504040204" pitchFamily="34" charset="0"/>
+                <a:cs typeface="Verdana" panose="020B0604030504040204" pitchFamily="34" charset="0"/>
+              </a:rPr>
+              <a:t>at compilation time, it is removed by compiler.</a:t>
+            </a:r>
+          </a:p>
+          <a:p>
+            <a:r>
+              <a:rPr lang="en-IN" sz="1400" dirty="0" smtClean="0">
+                <a:latin typeface="Verdana" panose="020B0604030504040204" pitchFamily="34" charset="0"/>
+                <a:ea typeface="Verdana" panose="020B0604030504040204" pitchFamily="34" charset="0"/>
+                <a:cs typeface="Verdana" panose="020B0604030504040204" pitchFamily="34" charset="0"/>
+              </a:rPr>
+              <a:t>Using “implements” keyword we can derive a class from interface.</a:t>
+            </a:r>
+          </a:p>
+          <a:p>
+            <a:r>
+              <a:rPr lang="en-IN" sz="1400" dirty="0" smtClean="0">
+                <a:latin typeface="Verdana" panose="020B0604030504040204" pitchFamily="34" charset="0"/>
+                <a:ea typeface="Verdana" panose="020B0604030504040204" pitchFamily="34" charset="0"/>
+                <a:cs typeface="Verdana" panose="020B0604030504040204" pitchFamily="34" charset="0"/>
+              </a:rPr>
+              <a:t>The class derived from interface should implement all abstract methods of interface, otherwise it should be declared as abstract else it leads to CTE.</a:t>
+            </a:r>
+          </a:p>
+          <a:p>
+            <a:r>
+              <a:rPr lang="en-IN" sz="1400" dirty="0" smtClean="0">
+                <a:latin typeface="Verdana" panose="020B0604030504040204" pitchFamily="34" charset="0"/>
+                <a:ea typeface="Verdana" panose="020B0604030504040204" pitchFamily="34" charset="0"/>
+                <a:cs typeface="Verdana" panose="020B0604030504040204" pitchFamily="34" charset="0"/>
+              </a:rPr>
+              <a:t>Sub class should implement interface method with public keyword, because interface method’s default accessibility modifier is public.</a:t>
+            </a:r>
+          </a:p>
+        </p:txBody>
+      </p:sp>
+    </p:spTree>
+    <p:extLst>
+      <p:ext uri="{BB962C8B-B14F-4D97-AF65-F5344CB8AC3E}">
+        <p14:creationId xmlns:p14="http://schemas.microsoft.com/office/powerpoint/2010/main" val="1296732210"/>
+      </p:ext>
+    </p:extLst>
+  </p:cSld>
+  <p:clrMapOvr>
+    <a:masterClrMapping/>
+  </p:clrMapOvr>
+  <p:timing>
+    <p:tnLst>
+      <p:par>
+        <p:cTn id="1" dur="indefinite" restart="never" nodeType="tmRoot"/>
+      </p:par>
+    </p:tnLst>
+  </p:timing>
+</p:sld>
+</file>
+
+<file path=ppt/slides/slide32.xml><?xml version="1.0" encoding="utf-8"?>
+<p:sld xmlns:a="http://schemas.openxmlformats.org/drawingml/2006/main" xmlns:r="http://schemas.openxmlformats.org/officeDocument/2006/relationships" xmlns:p="http://schemas.openxmlformats.org/presentationml/2006/main">
+  <p:cSld>
+    <p:spTree>
+      <p:nvGrpSpPr>
+        <p:cNvPr id="1" name=""/>
+        <p:cNvGrpSpPr/>
+        <p:nvPr/>
+      </p:nvGrpSpPr>
+      <p:grpSpPr>
+        <a:xfrm>
+          <a:off x="0" y="0"/>
+          <a:ext cx="0" cy="0"/>
+          <a:chOff x="0" y="0"/>
+          <a:chExt cx="0" cy="0"/>
+        </a:xfrm>
+      </p:grpSpPr>
+      <p:sp>
+        <p:nvSpPr>
+          <p:cNvPr id="2" name="Title 1"/>
+          <p:cNvSpPr>
+            <a:spLocks noGrp="1"/>
+          </p:cNvSpPr>
+          <p:nvPr>
+            <p:ph type="title"/>
+          </p:nvPr>
+        </p:nvSpPr>
+        <p:spPr>
+          <a:xfrm>
+            <a:off x="838200" y="365125"/>
+            <a:ext cx="10515600" cy="253061"/>
+          </a:xfrm>
+        </p:spPr>
+        <p:txBody>
+          <a:bodyPr>
+            <a:normAutofit fontScale="90000"/>
+          </a:bodyPr>
+          <a:lstStyle/>
+          <a:p>
+            <a:r>
+              <a:rPr lang="en-IN" sz="2000" b="1" dirty="0" smtClean="0">
+                <a:latin typeface="Verdana" panose="020B0604030504040204" pitchFamily="34" charset="0"/>
+                <a:ea typeface="Verdana" panose="020B0604030504040204" pitchFamily="34" charset="0"/>
+                <a:cs typeface="Verdana" panose="020B0604030504040204" pitchFamily="34" charset="0"/>
+              </a:rPr>
+              <a:t>Enum</a:t>
+            </a:r>
+            <a:endParaRPr lang="en-IN" sz="2000" b="1" dirty="0">
+              <a:latin typeface="Verdana" panose="020B0604030504040204" pitchFamily="34" charset="0"/>
+              <a:ea typeface="Verdana" panose="020B0604030504040204" pitchFamily="34" charset="0"/>
+              <a:cs typeface="Verdana" panose="020B0604030504040204" pitchFamily="34" charset="0"/>
+            </a:endParaRPr>
+          </a:p>
+        </p:txBody>
+      </p:sp>
+      <p:sp>
+        <p:nvSpPr>
+          <p:cNvPr id="3" name="Content Placeholder 2"/>
+          <p:cNvSpPr>
+            <a:spLocks noGrp="1"/>
+          </p:cNvSpPr>
+          <p:nvPr>
+            <p:ph idx="1"/>
+          </p:nvPr>
+        </p:nvSpPr>
+        <p:spPr>
+          <a:xfrm>
+            <a:off x="838200" y="618186"/>
+            <a:ext cx="10515600" cy="5558777"/>
+          </a:xfrm>
+        </p:spPr>
+        <p:txBody>
+          <a:bodyPr>
+            <a:normAutofit/>
+          </a:bodyPr>
+          <a:lstStyle/>
+          <a:p>
+            <a:r>
+              <a:rPr lang="en-IN" sz="1400" dirty="0" err="1">
+                <a:latin typeface="Verdana" panose="020B0604030504040204" pitchFamily="34" charset="0"/>
+                <a:ea typeface="Verdana" panose="020B0604030504040204" pitchFamily="34" charset="0"/>
+                <a:cs typeface="Verdana" panose="020B0604030504040204" pitchFamily="34" charset="0"/>
+              </a:rPr>
+              <a:t>Enums</a:t>
+            </a:r>
+            <a:r>
+              <a:rPr lang="en-IN" sz="1400" dirty="0">
+                <a:latin typeface="Verdana" panose="020B0604030504040204" pitchFamily="34" charset="0"/>
+                <a:ea typeface="Verdana" panose="020B0604030504040204" pitchFamily="34" charset="0"/>
+                <a:cs typeface="Verdana" panose="020B0604030504040204" pitchFamily="34" charset="0"/>
+              </a:rPr>
+              <a:t> </a:t>
+            </a:r>
+            <a:r>
+              <a:rPr lang="en-IN" sz="1400" dirty="0" smtClean="0">
+                <a:latin typeface="Verdana" panose="020B0604030504040204" pitchFamily="34" charset="0"/>
+                <a:ea typeface="Verdana" panose="020B0604030504040204" pitchFamily="34" charset="0"/>
+                <a:cs typeface="Verdana" panose="020B0604030504040204" pitchFamily="34" charset="0"/>
+              </a:rPr>
+              <a:t>are </a:t>
+            </a:r>
+            <a:r>
+              <a:rPr lang="en-IN" sz="1400" dirty="0">
+                <a:latin typeface="Verdana" panose="020B0604030504040204" pitchFamily="34" charset="0"/>
+                <a:ea typeface="Verdana" panose="020B0604030504040204" pitchFamily="34" charset="0"/>
+                <a:cs typeface="Verdana" panose="020B0604030504040204" pitchFamily="34" charset="0"/>
+              </a:rPr>
+              <a:t>mainly used for grouping similar kind of constants as a one unit. </a:t>
+            </a:r>
+            <a:r>
+              <a:rPr lang="en-IN" sz="1400" dirty="0" smtClean="0">
+                <a:latin typeface="Verdana" panose="020B0604030504040204" pitchFamily="34" charset="0"/>
+                <a:ea typeface="Verdana" panose="020B0604030504040204" pitchFamily="34" charset="0"/>
+                <a:cs typeface="Verdana" panose="020B0604030504040204" pitchFamily="34" charset="0"/>
+              </a:rPr>
+              <a:t>Constants </a:t>
+            </a:r>
+            <a:r>
+              <a:rPr lang="en-IN" sz="1400" dirty="0">
+                <a:latin typeface="Verdana" panose="020B0604030504040204" pitchFamily="34" charset="0"/>
+                <a:ea typeface="Verdana" panose="020B0604030504040204" pitchFamily="34" charset="0"/>
+                <a:cs typeface="Verdana" panose="020B0604030504040204" pitchFamily="34" charset="0"/>
+              </a:rPr>
+              <a:t>means static and final. </a:t>
+            </a:r>
+            <a:r>
+              <a:rPr lang="en-IN" sz="1400" dirty="0" err="1">
+                <a:latin typeface="Verdana" panose="020B0604030504040204" pitchFamily="34" charset="0"/>
+                <a:ea typeface="Verdana" panose="020B0604030504040204" pitchFamily="34" charset="0"/>
+                <a:cs typeface="Verdana" panose="020B0604030504040204" pitchFamily="34" charset="0"/>
+              </a:rPr>
+              <a:t>Enums</a:t>
+            </a:r>
+            <a:r>
+              <a:rPr lang="en-IN" sz="1400" dirty="0">
+                <a:latin typeface="Verdana" panose="020B0604030504040204" pitchFamily="34" charset="0"/>
+                <a:ea typeface="Verdana" panose="020B0604030504040204" pitchFamily="34" charset="0"/>
+                <a:cs typeface="Verdana" panose="020B0604030504040204" pitchFamily="34" charset="0"/>
+              </a:rPr>
+              <a:t> are introduced in JDK 1.5 onward. Before that similar kind of constants are grouped by declaring them as static and final in one class</a:t>
+            </a:r>
+            <a:r>
+              <a:rPr lang="en-IN" sz="1400" dirty="0" smtClean="0">
+                <a:latin typeface="Verdana" panose="020B0604030504040204" pitchFamily="34" charset="0"/>
+                <a:ea typeface="Verdana" panose="020B0604030504040204" pitchFamily="34" charset="0"/>
+                <a:cs typeface="Verdana" panose="020B0604030504040204" pitchFamily="34" charset="0"/>
+              </a:rPr>
+              <a:t>.</a:t>
+            </a:r>
+          </a:p>
+          <a:p>
+            <a:r>
+              <a:rPr lang="en-IN" sz="1400" dirty="0">
+                <a:latin typeface="Verdana" panose="020B0604030504040204" pitchFamily="34" charset="0"/>
+                <a:ea typeface="Verdana" panose="020B0604030504040204" pitchFamily="34" charset="0"/>
+                <a:cs typeface="Verdana" panose="020B0604030504040204" pitchFamily="34" charset="0"/>
+              </a:rPr>
+              <a:t>Enum </a:t>
+            </a:r>
+            <a:r>
+              <a:rPr lang="en-IN" sz="1400" dirty="0" smtClean="0">
+                <a:latin typeface="Verdana" panose="020B0604030504040204" pitchFamily="34" charset="0"/>
+                <a:ea typeface="Verdana" panose="020B0604030504040204" pitchFamily="34" charset="0"/>
+                <a:cs typeface="Verdana" panose="020B0604030504040204" pitchFamily="34" charset="0"/>
+              </a:rPr>
+              <a:t>is </a:t>
+            </a:r>
+            <a:r>
+              <a:rPr lang="en-IN" sz="1400" dirty="0">
+                <a:latin typeface="Verdana" panose="020B0604030504040204" pitchFamily="34" charset="0"/>
+                <a:ea typeface="Verdana" panose="020B0604030504040204" pitchFamily="34" charset="0"/>
+                <a:cs typeface="Verdana" panose="020B0604030504040204" pitchFamily="34" charset="0"/>
+              </a:rPr>
+              <a:t>a data type which contains a fixed set of constants</a:t>
+            </a:r>
+            <a:r>
+              <a:rPr lang="en-IN" sz="1400" dirty="0" smtClean="0">
+                <a:latin typeface="Verdana" panose="020B0604030504040204" pitchFamily="34" charset="0"/>
+                <a:ea typeface="Verdana" panose="020B0604030504040204" pitchFamily="34" charset="0"/>
+                <a:cs typeface="Verdana" panose="020B0604030504040204" pitchFamily="34" charset="0"/>
+              </a:rPr>
+              <a:t>.</a:t>
+            </a:r>
+          </a:p>
+          <a:p>
+            <a:r>
+              <a:rPr lang="en-IN" sz="1400" dirty="0" smtClean="0">
+                <a:latin typeface="Verdana" panose="020B0604030504040204" pitchFamily="34" charset="0"/>
+                <a:ea typeface="Verdana" panose="020B0604030504040204" pitchFamily="34" charset="0"/>
+                <a:cs typeface="Verdana" panose="020B0604030504040204" pitchFamily="34" charset="0"/>
+              </a:rPr>
+              <a:t>“enum” is a “final class”. So we can’t derive a subclass form enum.</a:t>
+            </a:r>
+          </a:p>
+          <a:p>
+            <a:r>
+              <a:rPr lang="en-IN" sz="1400" dirty="0" smtClean="0">
+                <a:latin typeface="Verdana" panose="020B0604030504040204" pitchFamily="34" charset="0"/>
+                <a:ea typeface="Verdana" panose="020B0604030504040204" pitchFamily="34" charset="0"/>
+                <a:cs typeface="Verdana" panose="020B0604030504040204" pitchFamily="34" charset="0"/>
+              </a:rPr>
+              <a:t>It is a subclass of </a:t>
+            </a:r>
+            <a:r>
+              <a:rPr lang="en-IN" sz="1400" dirty="0" err="1" smtClean="0">
+                <a:latin typeface="Verdana" panose="020B0604030504040204" pitchFamily="34" charset="0"/>
+                <a:ea typeface="Verdana" panose="020B0604030504040204" pitchFamily="34" charset="0"/>
+                <a:cs typeface="Verdana" panose="020B0604030504040204" pitchFamily="34" charset="0"/>
+              </a:rPr>
+              <a:t>java.lang.Enum</a:t>
+            </a:r>
+            <a:endParaRPr lang="en-IN" sz="1400" dirty="0" smtClean="0">
+              <a:latin typeface="Verdana" panose="020B0604030504040204" pitchFamily="34" charset="0"/>
+              <a:ea typeface="Verdana" panose="020B0604030504040204" pitchFamily="34" charset="0"/>
+              <a:cs typeface="Verdana" panose="020B0604030504040204" pitchFamily="34" charset="0"/>
+            </a:endParaRPr>
+          </a:p>
+          <a:p>
+            <a:r>
+              <a:rPr lang="en-IN" sz="1400" dirty="0" smtClean="0">
+                <a:latin typeface="Verdana" panose="020B0604030504040204" pitchFamily="34" charset="0"/>
+                <a:ea typeface="Verdana" panose="020B0604030504040204" pitchFamily="34" charset="0"/>
+                <a:cs typeface="Verdana" panose="020B0604030504040204" pitchFamily="34" charset="0"/>
+              </a:rPr>
+              <a:t>It is a abstract class which is the default super class for every enum type classes. Also it is implementing form comparable and Serializable interface.</a:t>
+            </a:r>
+          </a:p>
+          <a:p>
+            <a:r>
+              <a:rPr lang="en-IN" sz="1400" dirty="0" smtClean="0">
+                <a:latin typeface="Verdana" panose="020B0604030504040204" pitchFamily="34" charset="0"/>
+                <a:ea typeface="Verdana" panose="020B0604030504040204" pitchFamily="34" charset="0"/>
+                <a:cs typeface="Verdana" panose="020B0604030504040204" pitchFamily="34" charset="0"/>
+              </a:rPr>
+              <a:t>All named constants created inside enum are referenced type the current enum type.</a:t>
+            </a:r>
+          </a:p>
+          <a:p>
+            <a:r>
+              <a:rPr lang="en-IN" sz="1400" dirty="0" smtClean="0">
+                <a:latin typeface="Verdana" panose="020B0604030504040204" pitchFamily="34" charset="0"/>
+                <a:ea typeface="Verdana" panose="020B0604030504040204" pitchFamily="34" charset="0"/>
+                <a:cs typeface="Verdana" panose="020B0604030504040204" pitchFamily="34" charset="0"/>
+              </a:rPr>
+              <a:t>Since enum is keyword so we can’t end package name with it. Example: </a:t>
+            </a:r>
+            <a:r>
+              <a:rPr lang="en-IN" sz="1400" dirty="0" err="1" smtClean="0">
+                <a:latin typeface="Verdana" panose="020B0604030504040204" pitchFamily="34" charset="0"/>
+                <a:ea typeface="Verdana" panose="020B0604030504040204" pitchFamily="34" charset="0"/>
+                <a:cs typeface="Verdana" panose="020B0604030504040204" pitchFamily="34" charset="0"/>
+              </a:rPr>
+              <a:t>com.iettech.enum</a:t>
+            </a:r>
+            <a:r>
+              <a:rPr lang="en-IN" sz="1400" dirty="0" smtClean="0">
+                <a:latin typeface="Verdana" panose="020B0604030504040204" pitchFamily="34" charset="0"/>
+                <a:ea typeface="Verdana" panose="020B0604030504040204" pitchFamily="34" charset="0"/>
+                <a:cs typeface="Verdana" panose="020B0604030504040204" pitchFamily="34" charset="0"/>
+              </a:rPr>
+              <a:t> not a valid package name.</a:t>
+            </a:r>
+          </a:p>
+          <a:p>
+            <a:r>
+              <a:rPr lang="en-IN" sz="1400" dirty="0" smtClean="0">
+                <a:latin typeface="Verdana" panose="020B0604030504040204" pitchFamily="34" charset="0"/>
+                <a:ea typeface="Verdana" panose="020B0604030504040204" pitchFamily="34" charset="0"/>
+                <a:cs typeface="Verdana" panose="020B0604030504040204" pitchFamily="34" charset="0"/>
+              </a:rPr>
+              <a:t>Enum can implement interface.</a:t>
+            </a:r>
+          </a:p>
+          <a:p>
+            <a:r>
+              <a:rPr lang="en-IN" sz="1400" dirty="0" smtClean="0">
+                <a:latin typeface="Verdana" panose="020B0604030504040204" pitchFamily="34" charset="0"/>
+                <a:ea typeface="Verdana" panose="020B0604030504040204" pitchFamily="34" charset="0"/>
+                <a:cs typeface="Verdana" panose="020B0604030504040204" pitchFamily="34" charset="0"/>
+              </a:rPr>
+              <a:t>Enum constructor are always private. So we can’t create instance of enum using new operator.</a:t>
+            </a:r>
+          </a:p>
+          <a:p>
+            <a:r>
+              <a:rPr lang="en-IN" sz="1400" dirty="0" smtClean="0">
+                <a:latin typeface="Verdana" panose="020B0604030504040204" pitchFamily="34" charset="0"/>
+                <a:ea typeface="Verdana" panose="020B0604030504040204" pitchFamily="34" charset="0"/>
+                <a:cs typeface="Verdana" panose="020B0604030504040204" pitchFamily="34" charset="0"/>
+              </a:rPr>
+              <a:t>We can declare abstract methods in enum, then all the enum fields must implement the abstract methods.</a:t>
+            </a:r>
+          </a:p>
+          <a:p>
+            <a:r>
+              <a:rPr lang="en-IN" sz="1400" dirty="0" smtClean="0">
+                <a:latin typeface="Verdana" panose="020B0604030504040204" pitchFamily="34" charset="0"/>
+                <a:ea typeface="Verdana" panose="020B0604030504040204" pitchFamily="34" charset="0"/>
+                <a:cs typeface="Verdana" panose="020B0604030504040204" pitchFamily="34" charset="0"/>
+              </a:rPr>
+              <a:t>We can define a method in an enum and enum field can override them too.</a:t>
+            </a:r>
+          </a:p>
+          <a:p>
+            <a:r>
+              <a:rPr lang="en-IN" sz="1400" dirty="0" smtClean="0">
+                <a:latin typeface="Verdana" panose="020B0604030504040204" pitchFamily="34" charset="0"/>
+                <a:ea typeface="Verdana" panose="020B0604030504040204" pitchFamily="34" charset="0"/>
+                <a:cs typeface="Verdana" panose="020B0604030504040204" pitchFamily="34" charset="0"/>
+              </a:rPr>
+              <a:t>Enum can be used in switch statement.</a:t>
+            </a:r>
+          </a:p>
+          <a:p>
+            <a:endParaRPr lang="en-IN" sz="1400" dirty="0" smtClean="0">
+              <a:latin typeface="Verdana" panose="020B0604030504040204" pitchFamily="34" charset="0"/>
+              <a:ea typeface="Verdana" panose="020B0604030504040204" pitchFamily="34" charset="0"/>
+              <a:cs typeface="Verdana" panose="020B0604030504040204" pitchFamily="34" charset="0"/>
+            </a:endParaRPr>
+          </a:p>
+          <a:p>
+            <a:endParaRPr lang="en-IN" sz="1400" dirty="0">
+              <a:latin typeface="Verdana" panose="020B0604030504040204" pitchFamily="34" charset="0"/>
+              <a:ea typeface="Verdana" panose="020B0604030504040204" pitchFamily="34" charset="0"/>
+              <a:cs typeface="Verdana" panose="020B0604030504040204" pitchFamily="34" charset="0"/>
+            </a:endParaRPr>
+          </a:p>
+        </p:txBody>
+      </p:sp>
+    </p:spTree>
+    <p:extLst>
+      <p:ext uri="{BB962C8B-B14F-4D97-AF65-F5344CB8AC3E}">
+        <p14:creationId xmlns:p14="http://schemas.microsoft.com/office/powerpoint/2010/main" val="1593318072"/>
       </p:ext>
     </p:extLst>
   </p:cSld>

</xml_diff>